<commit_message>
poster version 2, with xkcd
</commit_message>
<xml_diff>
--- a/publications/2016_hawg_poster_geneva.pptx
+++ b/publications/2016_hawg_poster_geneva.pptx
@@ -256,7 +256,7 @@
           <a:bodyPr lIns="0" rIns="0" tIns="0" bIns="0" anchor="b"/>
           <a:p>
             <a:pPr algn="r"/>
-            <a:fld id="{25219E7E-A771-4588-8CFA-E8620DEBB92F}" type="slidenum">
+            <a:fld id="{8B247832-8A78-4095-B3F6-B846C9726D4C}" type="slidenum">
               <a:rPr b="0" lang="en-US" sz="1400" spc="-1" strike="noStrike">
                 <a:solidFill>
                   <a:srgbClr val="000000"/>
@@ -309,14 +309,14 @@
       </p:grpSpPr>
       <p:sp>
         <p:nvSpPr>
-          <p:cNvPr id="70" name="CustomShape 1"/>
+          <p:cNvPr id="89" name="CustomShape 1"/>
           <p:cNvSpPr/>
           <p:nvPr/>
         </p:nvSpPr>
         <p:spPr>
           <a:xfrm>
             <a:off x="4280040" y="10156680"/>
-            <a:ext cx="3277440" cy="532800"/>
+            <a:ext cx="3276360" cy="531720"/>
           </a:xfrm>
           <a:prstGeom prst="rect">
             <a:avLst/>
@@ -371,14 +371,14 @@
       </p:sp>
       <p:sp>
         <p:nvSpPr>
-          <p:cNvPr id="71" name="CustomShape 2"/>
+          <p:cNvPr id="90" name="CustomShape 2"/>
           <p:cNvSpPr/>
           <p:nvPr/>
         </p:nvSpPr>
         <p:spPr>
           <a:xfrm>
             <a:off x="755640" y="5078520"/>
-            <a:ext cx="6047640" cy="4811040"/>
+            <a:ext cx="6046560" cy="4809960"/>
           </a:xfrm>
           <a:prstGeom prst="rect">
             <a:avLst/>
@@ -397,7 +397,7 @@
       </p:sp>
       <p:sp>
         <p:nvSpPr>
-          <p:cNvPr id="72" name="PlaceHolder 3"/>
+          <p:cNvPr id="91" name="PlaceHolder 3"/>
           <p:cNvSpPr>
             <a:spLocks noGrp="1"/>
           </p:cNvSpPr>
@@ -408,7 +408,7 @@
         <p:spPr>
           <a:xfrm>
             <a:off x="756000" y="5078520"/>
-            <a:ext cx="6046920" cy="4810680"/>
+            <a:ext cx="6045840" cy="4809600"/>
           </a:xfrm>
           <a:prstGeom prst="rect">
             <a:avLst/>
@@ -488,7 +488,7 @@
         <p:spPr>
           <a:xfrm>
             <a:off x="1512000" y="1706400"/>
-            <a:ext cx="27215640" cy="7141680"/>
+            <a:ext cx="27214920" cy="7140960"/>
           </a:xfrm>
           <a:prstGeom prst="rect">
             <a:avLst/>
@@ -525,7 +525,7 @@
         <p:spPr>
           <a:xfrm>
             <a:off x="1512000" y="10007280"/>
-            <a:ext cx="27215640" cy="11831400"/>
+            <a:ext cx="27215280" cy="11831400"/>
           </a:xfrm>
           <a:prstGeom prst="rect">
             <a:avLst/>
@@ -561,7 +561,7 @@
         <p:spPr>
           <a:xfrm>
             <a:off x="1512000" y="22962960"/>
-            <a:ext cx="27215640" cy="11831400"/>
+            <a:ext cx="27215280" cy="11831400"/>
           </a:xfrm>
           <a:prstGeom prst="rect">
             <a:avLst/>
@@ -619,7 +619,7 @@
         <p:spPr>
           <a:xfrm>
             <a:off x="1512000" y="1706400"/>
-            <a:ext cx="27215640" cy="7141680"/>
+            <a:ext cx="27214920" cy="7140960"/>
           </a:xfrm>
           <a:prstGeom prst="rect">
             <a:avLst/>
@@ -656,7 +656,7 @@
         <p:spPr>
           <a:xfrm>
             <a:off x="1512000" y="10007280"/>
-            <a:ext cx="13281120" cy="11831400"/>
+            <a:ext cx="13280760" cy="11831400"/>
           </a:xfrm>
           <a:prstGeom prst="rect">
             <a:avLst/>
@@ -691,8 +691,8 @@
         </p:nvSpPr>
         <p:spPr>
           <a:xfrm>
-            <a:off x="15457680" y="10007280"/>
-            <a:ext cx="13281120" cy="11831400"/>
+            <a:off x="15457320" y="10007280"/>
+            <a:ext cx="13280760" cy="11831400"/>
           </a:xfrm>
           <a:prstGeom prst="rect">
             <a:avLst/>
@@ -727,8 +727,8 @@
         </p:nvSpPr>
         <p:spPr>
           <a:xfrm>
-            <a:off x="15457680" y="22962960"/>
-            <a:ext cx="13281120" cy="11831400"/>
+            <a:off x="15457320" y="22962960"/>
+            <a:ext cx="13280760" cy="11831400"/>
           </a:xfrm>
           <a:prstGeom prst="rect">
             <a:avLst/>
@@ -764,7 +764,7 @@
         <p:spPr>
           <a:xfrm>
             <a:off x="1512000" y="22962960"/>
-            <a:ext cx="13281120" cy="11831400"/>
+            <a:ext cx="13280760" cy="11831400"/>
           </a:xfrm>
           <a:prstGeom prst="rect">
             <a:avLst/>
@@ -822,7 +822,7 @@
         <p:spPr>
           <a:xfrm>
             <a:off x="1512000" y="1706400"/>
-            <a:ext cx="27215640" cy="7141680"/>
+            <a:ext cx="27214920" cy="7140960"/>
           </a:xfrm>
           <a:prstGeom prst="rect">
             <a:avLst/>
@@ -859,7 +859,7 @@
         <p:spPr>
           <a:xfrm>
             <a:off x="1512000" y="10007280"/>
-            <a:ext cx="27215640" cy="24804360"/>
+            <a:ext cx="27215280" cy="24804000"/>
           </a:xfrm>
           <a:prstGeom prst="rect">
             <a:avLst/>
@@ -895,7 +895,7 @@
         <p:spPr>
           <a:xfrm>
             <a:off x="1512000" y="10007280"/>
-            <a:ext cx="27215640" cy="24804360"/>
+            <a:ext cx="27215280" cy="24804000"/>
           </a:xfrm>
           <a:prstGeom prst="rect">
             <a:avLst/>
@@ -930,8 +930,8 @@
         </p:blipFill>
         <p:spPr>
           <a:xfrm>
-            <a:off x="1511640" y="11552040"/>
-            <a:ext cx="27215640" cy="21714480"/>
+            <a:off x="1512000" y="11552040"/>
+            <a:ext cx="27215280" cy="21714120"/>
           </a:xfrm>
           <a:prstGeom prst="rect">
             <a:avLst/>
@@ -953,8 +953,8 @@
         </p:blipFill>
         <p:spPr>
           <a:xfrm>
-            <a:off x="1511640" y="11552040"/>
-            <a:ext cx="27215640" cy="21714480"/>
+            <a:off x="1512000" y="11552040"/>
+            <a:ext cx="27215280" cy="21714120"/>
           </a:xfrm>
           <a:prstGeom prst="rect">
             <a:avLst/>
@@ -999,7 +999,7 @@
         <p:spPr>
           <a:xfrm>
             <a:off x="1512000" y="1706400"/>
-            <a:ext cx="27215640" cy="7141680"/>
+            <a:ext cx="27214920" cy="7140960"/>
           </a:xfrm>
           <a:prstGeom prst="rect">
             <a:avLst/>
@@ -1036,7 +1036,7 @@
         <p:spPr>
           <a:xfrm>
             <a:off x="1512000" y="10007280"/>
-            <a:ext cx="27215640" cy="24804360"/>
+            <a:ext cx="27215280" cy="24804000"/>
           </a:xfrm>
           <a:prstGeom prst="rect">
             <a:avLst/>
@@ -1095,7 +1095,7 @@
         <p:spPr>
           <a:xfrm>
             <a:off x="1512000" y="1706400"/>
-            <a:ext cx="27215640" cy="7141680"/>
+            <a:ext cx="27214920" cy="7140960"/>
           </a:xfrm>
           <a:prstGeom prst="rect">
             <a:avLst/>
@@ -1132,7 +1132,7 @@
         <p:spPr>
           <a:xfrm>
             <a:off x="1512000" y="10007280"/>
-            <a:ext cx="27215640" cy="24804360"/>
+            <a:ext cx="27215280" cy="24804000"/>
           </a:xfrm>
           <a:prstGeom prst="rect">
             <a:avLst/>
@@ -1190,7 +1190,7 @@
         <p:spPr>
           <a:xfrm>
             <a:off x="1512000" y="1706400"/>
-            <a:ext cx="27215640" cy="7141680"/>
+            <a:ext cx="27214920" cy="7140960"/>
           </a:xfrm>
           <a:prstGeom prst="rect">
             <a:avLst/>
@@ -1227,7 +1227,7 @@
         <p:spPr>
           <a:xfrm>
             <a:off x="1512000" y="10007280"/>
-            <a:ext cx="13281120" cy="24804360"/>
+            <a:ext cx="13280760" cy="24804000"/>
           </a:xfrm>
           <a:prstGeom prst="rect">
             <a:avLst/>
@@ -1262,8 +1262,8 @@
         </p:nvSpPr>
         <p:spPr>
           <a:xfrm>
-            <a:off x="15457680" y="10007280"/>
-            <a:ext cx="13281120" cy="24804360"/>
+            <a:off x="15457320" y="10007280"/>
+            <a:ext cx="13280760" cy="24804000"/>
           </a:xfrm>
           <a:prstGeom prst="rect">
             <a:avLst/>
@@ -1321,7 +1321,7 @@
         <p:spPr>
           <a:xfrm>
             <a:off x="1512000" y="1706400"/>
-            <a:ext cx="27215640" cy="7141680"/>
+            <a:ext cx="27214920" cy="7140960"/>
           </a:xfrm>
           <a:prstGeom prst="rect">
             <a:avLst/>
@@ -1380,7 +1380,7 @@
         <p:spPr>
           <a:xfrm>
             <a:off x="1512000" y="1706400"/>
-            <a:ext cx="27215640" cy="33105960"/>
+            <a:ext cx="27214920" cy="33102360"/>
           </a:xfrm>
           <a:prstGeom prst="rect">
             <a:avLst/>
@@ -1439,7 +1439,7 @@
         <p:spPr>
           <a:xfrm>
             <a:off x="1512000" y="1706400"/>
-            <a:ext cx="27215640" cy="7141680"/>
+            <a:ext cx="27214920" cy="7140960"/>
           </a:xfrm>
           <a:prstGeom prst="rect">
             <a:avLst/>
@@ -1476,7 +1476,7 @@
         <p:spPr>
           <a:xfrm>
             <a:off x="1512000" y="10007280"/>
-            <a:ext cx="13281120" cy="11831400"/>
+            <a:ext cx="13280760" cy="11831400"/>
           </a:xfrm>
           <a:prstGeom prst="rect">
             <a:avLst/>
@@ -1512,7 +1512,7 @@
         <p:spPr>
           <a:xfrm>
             <a:off x="1512000" y="22962960"/>
-            <a:ext cx="13281120" cy="11831400"/>
+            <a:ext cx="13280760" cy="11831400"/>
           </a:xfrm>
           <a:prstGeom prst="rect">
             <a:avLst/>
@@ -1547,8 +1547,8 @@
         </p:nvSpPr>
         <p:spPr>
           <a:xfrm>
-            <a:off x="15457680" y="10007280"/>
-            <a:ext cx="13281120" cy="24804360"/>
+            <a:off x="15457320" y="10007280"/>
+            <a:ext cx="13280760" cy="24804000"/>
           </a:xfrm>
           <a:prstGeom prst="rect">
             <a:avLst/>
@@ -1606,7 +1606,7 @@
         <p:spPr>
           <a:xfrm>
             <a:off x="1512000" y="1706400"/>
-            <a:ext cx="27215640" cy="7141680"/>
+            <a:ext cx="27214920" cy="7140960"/>
           </a:xfrm>
           <a:prstGeom prst="rect">
             <a:avLst/>
@@ -1643,7 +1643,7 @@
         <p:spPr>
           <a:xfrm>
             <a:off x="1512000" y="10007280"/>
-            <a:ext cx="13281120" cy="24804360"/>
+            <a:ext cx="13280760" cy="24804000"/>
           </a:xfrm>
           <a:prstGeom prst="rect">
             <a:avLst/>
@@ -1678,8 +1678,8 @@
         </p:nvSpPr>
         <p:spPr>
           <a:xfrm>
-            <a:off x="15457680" y="10007280"/>
-            <a:ext cx="13281120" cy="11831400"/>
+            <a:off x="15457320" y="10007280"/>
+            <a:ext cx="13280760" cy="11831400"/>
           </a:xfrm>
           <a:prstGeom prst="rect">
             <a:avLst/>
@@ -1714,8 +1714,8 @@
         </p:nvSpPr>
         <p:spPr>
           <a:xfrm>
-            <a:off x="15457680" y="22962960"/>
-            <a:ext cx="13281120" cy="11831400"/>
+            <a:off x="15457320" y="22962960"/>
+            <a:ext cx="13280760" cy="11831400"/>
           </a:xfrm>
           <a:prstGeom prst="rect">
             <a:avLst/>
@@ -1773,7 +1773,7 @@
         <p:spPr>
           <a:xfrm>
             <a:off x="1512000" y="1706400"/>
-            <a:ext cx="27215640" cy="7141680"/>
+            <a:ext cx="27214920" cy="7140960"/>
           </a:xfrm>
           <a:prstGeom prst="rect">
             <a:avLst/>
@@ -1810,7 +1810,7 @@
         <p:spPr>
           <a:xfrm>
             <a:off x="1512000" y="10007280"/>
-            <a:ext cx="13281120" cy="11831400"/>
+            <a:ext cx="13280760" cy="11831400"/>
           </a:xfrm>
           <a:prstGeom prst="rect">
             <a:avLst/>
@@ -1845,8 +1845,8 @@
         </p:nvSpPr>
         <p:spPr>
           <a:xfrm>
-            <a:off x="15457680" y="10007280"/>
-            <a:ext cx="13281120" cy="11831400"/>
+            <a:off x="15457320" y="10007280"/>
+            <a:ext cx="13280760" cy="11831400"/>
           </a:xfrm>
           <a:prstGeom prst="rect">
             <a:avLst/>
@@ -1882,7 +1882,7 @@
         <p:spPr>
           <a:xfrm>
             <a:off x="1512000" y="22962960"/>
-            <a:ext cx="27215640" cy="11831400"/>
+            <a:ext cx="27215280" cy="11831400"/>
           </a:xfrm>
           <a:prstGeom prst="rect">
             <a:avLst/>
@@ -1943,7 +1943,7 @@
         <p:spPr>
           <a:xfrm>
             <a:off x="1509840" y="1701720"/>
-            <a:ext cx="27212040" cy="7138440"/>
+            <a:ext cx="27210960" cy="7137360"/>
           </a:xfrm>
           <a:prstGeom prst="rect">
             <a:avLst/>
@@ -1969,7 +1969,7 @@
         <p:spPr>
           <a:xfrm>
             <a:off x="1509840" y="10007640"/>
-            <a:ext cx="27212040" cy="28225080"/>
+            <a:ext cx="27210960" cy="28224000"/>
           </a:xfrm>
           <a:prstGeom prst="rect">
             <a:avLst/>
@@ -1995,7 +1995,7 @@
         <p:spPr>
           <a:xfrm>
             <a:off x="1509840" y="38958840"/>
-            <a:ext cx="7043040" cy="2947320"/>
+            <a:ext cx="7041960" cy="2946240"/>
           </a:xfrm>
           <a:prstGeom prst="rect">
             <a:avLst/>
@@ -2021,7 +2021,7 @@
         <p:spPr>
           <a:xfrm>
             <a:off x="10341000" y="38958840"/>
-            <a:ext cx="9582840" cy="2947320"/>
+            <a:ext cx="9581760" cy="2946240"/>
           </a:xfrm>
           <a:prstGeom prst="rect">
             <a:avLst/>
@@ -2047,7 +2047,7 @@
         <p:spPr>
           <a:xfrm>
             <a:off x="21680640" y="38958840"/>
-            <a:ext cx="7043040" cy="2947320"/>
+            <a:ext cx="7041960" cy="2946240"/>
           </a:xfrm>
           <a:prstGeom prst="rect">
             <a:avLst/>
@@ -2077,7 +2077,7 @@
         <p:spPr>
           <a:xfrm>
             <a:off x="1512000" y="1706400"/>
-            <a:ext cx="27215640" cy="7141680"/>
+            <a:ext cx="27214920" cy="7140960"/>
           </a:xfrm>
           <a:prstGeom prst="rect">
             <a:avLst/>
@@ -2087,20 +2087,6 @@
           <a:bodyPr lIns="0" rIns="0" tIns="0" bIns="0" anchor="ctr"/>
           <a:p>
             <a:pPr algn="ctr"/>
-            <a:r>
-              <a:rPr b="0" lang="en-US" sz="4400" spc="-1" strike="noStrike">
-                <a:solidFill>
-                  <a:srgbClr val="000000"/>
-                </a:solidFill>
-                <a:uFill>
-                  <a:solidFill>
-                    <a:srgbClr val="ffffff"/>
-                  </a:solidFill>
-                </a:uFill>
-                <a:latin typeface="Arial"/>
-              </a:rPr>
-              <a:t>Click to edit the title text format</a:t>
-            </a:r>
             <a:endParaRPr b="0" lang="en-US" sz="4400" spc="-1" strike="noStrike">
               <a:solidFill>
                 <a:srgbClr val="000000"/>
@@ -2128,7 +2114,7 @@
         <p:spPr>
           <a:xfrm>
             <a:off x="1512000" y="10007280"/>
-            <a:ext cx="27215640" cy="24804360"/>
+            <a:ext cx="27215280" cy="24804000"/>
           </a:xfrm>
           <a:prstGeom prst="rect">
             <a:avLst/>
@@ -2146,7 +2132,7 @@
               <a:buChar char=""/>
             </a:pPr>
             <a:r>
-              <a:rPr b="0" lang="en-US" sz="3200" spc="-1" strike="noStrike">
+              <a:rPr b="0" lang="en-US" sz="1800" spc="-1" strike="noStrike">
                 <a:solidFill>
                   <a:srgbClr val="000000"/>
                 </a:solidFill>
@@ -2159,7 +2145,7 @@
               </a:rPr>
               <a:t>Click to edit the outline text format</a:t>
             </a:r>
-            <a:endParaRPr b="0" lang="en-US" sz="3200" spc="-1" strike="noStrike">
+            <a:endParaRPr b="0" lang="en-US" sz="1800" spc="-1" strike="noStrike">
               <a:solidFill>
                 <a:srgbClr val="000000"/>
               </a:solidFill>
@@ -2181,7 +2167,7 @@
               <a:buChar char=""/>
             </a:pPr>
             <a:r>
-              <a:rPr b="0" lang="en-US" sz="2800" spc="-1" strike="noStrike">
+              <a:rPr b="0" lang="en-US" sz="1800" spc="-1" strike="noStrike">
                 <a:solidFill>
                   <a:srgbClr val="000000"/>
                 </a:solidFill>
@@ -2194,7 +2180,7 @@
               </a:rPr>
               <a:t>Second Outline Level</a:t>
             </a:r>
-            <a:endParaRPr b="0" lang="en-US" sz="2800" spc="-1" strike="noStrike">
+            <a:endParaRPr b="0" lang="en-US" sz="1800" spc="-1" strike="noStrike">
               <a:solidFill>
                 <a:srgbClr val="000000"/>
               </a:solidFill>
@@ -2216,7 +2202,7 @@
               <a:buChar char=""/>
             </a:pPr>
             <a:r>
-              <a:rPr b="0" lang="en-US" sz="2400" spc="-1" strike="noStrike">
+              <a:rPr b="0" lang="en-US" sz="1800" spc="-1" strike="noStrike">
                 <a:solidFill>
                   <a:srgbClr val="000000"/>
                 </a:solidFill>
@@ -2229,7 +2215,7 @@
               </a:rPr>
               <a:t>Third Outline Level</a:t>
             </a:r>
-            <a:endParaRPr b="0" lang="en-US" sz="2400" spc="-1" strike="noStrike">
+            <a:endParaRPr b="0" lang="en-US" sz="1800" spc="-1" strike="noStrike">
               <a:solidFill>
                 <a:srgbClr val="000000"/>
               </a:solidFill>
@@ -2251,7 +2237,7 @@
               <a:buChar char=""/>
             </a:pPr>
             <a:r>
-              <a:rPr b="0" lang="en-US" sz="2000" spc="-1" strike="noStrike">
+              <a:rPr b="0" lang="en-US" sz="1800" spc="-1" strike="noStrike">
                 <a:solidFill>
                   <a:srgbClr val="000000"/>
                 </a:solidFill>
@@ -2264,7 +2250,7 @@
               </a:rPr>
               <a:t>Fourth Outline Level</a:t>
             </a:r>
-            <a:endParaRPr b="0" lang="en-US" sz="2000" spc="-1" strike="noStrike">
+            <a:endParaRPr b="0" lang="en-US" sz="1800" spc="-1" strike="noStrike">
               <a:solidFill>
                 <a:srgbClr val="000000"/>
               </a:solidFill>
@@ -2286,7 +2272,7 @@
               <a:buChar char=""/>
             </a:pPr>
             <a:r>
-              <a:rPr b="0" lang="en-US" sz="2000" spc="-1" strike="noStrike">
+              <a:rPr b="0" lang="en-US" sz="1800" spc="-1" strike="noStrike">
                 <a:solidFill>
                   <a:srgbClr val="000000"/>
                 </a:solidFill>
@@ -2299,7 +2285,7 @@
               </a:rPr>
               <a:t>Fifth Outline Level</a:t>
             </a:r>
-            <a:endParaRPr b="0" lang="en-US" sz="2000" spc="-1" strike="noStrike">
+            <a:endParaRPr b="0" lang="en-US" sz="1800" spc="-1" strike="noStrike">
               <a:solidFill>
                 <a:srgbClr val="000000"/>
               </a:solidFill>
@@ -2321,7 +2307,7 @@
               <a:buChar char=""/>
             </a:pPr>
             <a:r>
-              <a:rPr b="0" lang="en-US" sz="2000" spc="-1" strike="noStrike">
+              <a:rPr b="0" lang="en-US" sz="1800" spc="-1" strike="noStrike">
                 <a:solidFill>
                   <a:srgbClr val="000000"/>
                 </a:solidFill>
@@ -2334,7 +2320,7 @@
               </a:rPr>
               <a:t>Sixth Outline Level</a:t>
             </a:r>
-            <a:endParaRPr b="0" lang="en-US" sz="2000" spc="-1" strike="noStrike">
+            <a:endParaRPr b="0" lang="en-US" sz="1800" spc="-1" strike="noStrike">
               <a:solidFill>
                 <a:srgbClr val="000000"/>
               </a:solidFill>
@@ -2356,7 +2342,7 @@
               <a:buChar char=""/>
             </a:pPr>
             <a:r>
-              <a:rPr b="0" lang="en-US" sz="2000" spc="-1" strike="noStrike">
+              <a:rPr b="0" lang="en-US" sz="1800" spc="-1" strike="noStrike">
                 <a:solidFill>
                   <a:srgbClr val="000000"/>
                 </a:solidFill>
@@ -2369,7 +2355,7 @@
               </a:rPr>
               <a:t>Seventh Outline Level</a:t>
             </a:r>
-            <a:endParaRPr b="0" lang="en-US" sz="2000" spc="-1" strike="noStrike">
+            <a:endParaRPr b="0" lang="en-US" sz="1800" spc="-1" strike="noStrike">
               <a:solidFill>
                 <a:srgbClr val="000000"/>
               </a:solidFill>
@@ -2429,7 +2415,7 @@
         <p:spPr>
           <a:xfrm>
             <a:off x="15432480" y="10972800"/>
-            <a:ext cx="14505840" cy="9966600"/>
+            <a:ext cx="14504760" cy="8162640"/>
           </a:xfrm>
           <a:prstGeom prst="rect">
             <a:avLst/>
@@ -2573,7 +2559,7 @@
                 <a:latin typeface="Arial"/>
                 <a:ea typeface="Arial"/>
               </a:rPr>
-              <a:t>* Collaborative</a:t>
+              <a:t>* Used </a:t>
             </a:r>
             <a:endParaRPr b="0" lang="en-US" sz="1800" spc="-1" strike="noStrike">
               <a:solidFill>
@@ -2606,6 +2592,39 @@
                 <a:latin typeface="Arial"/>
                 <a:ea typeface="Arial"/>
               </a:rPr>
+              <a:t>Collaborative</a:t>
+            </a:r>
+            <a:endParaRPr b="0" lang="en-US" sz="1800" spc="-1" strike="noStrike">
+              <a:solidFill>
+                <a:srgbClr val="000000"/>
+              </a:solidFill>
+              <a:uFill>
+                <a:solidFill>
+                  <a:srgbClr val="ffffff"/>
+                </a:solidFill>
+              </a:uFill>
+              <a:latin typeface="Arial"/>
+            </a:endParaRPr>
+          </a:p>
+          <a:p>
+            <a:pPr algn="just">
+              <a:lnSpc>
+                <a:spcPct val="100000"/>
+              </a:lnSpc>
+            </a:pPr>
+            <a:r>
+              <a:rPr b="0" lang="en-US" sz="4000" spc="-1" strike="noStrike">
+                <a:solidFill>
+                  <a:srgbClr val="000000"/>
+                </a:solidFill>
+                <a:uFill>
+                  <a:solidFill>
+                    <a:srgbClr val="ffffff"/>
+                  </a:solidFill>
+                </a:uFill>
+                <a:latin typeface="Arial"/>
+                <a:ea typeface="Arial"/>
+              </a:rPr>
               <a:t>Research tools</a:t>
             </a:r>
             <a:endParaRPr b="0" lang="en-US" sz="1800" spc="-1" strike="noStrike">
@@ -2659,6 +2678,24 @@
               </a:rPr>
               <a:t>- Github / Git</a:t>
             </a:r>
+            <a:endParaRPr b="0" lang="en-US" sz="1800" spc="-1" strike="noStrike">
+              <a:solidFill>
+                <a:srgbClr val="000000"/>
+              </a:solidFill>
+              <a:uFill>
+                <a:solidFill>
+                  <a:srgbClr val="ffffff"/>
+                </a:solidFill>
+              </a:uFill>
+              <a:latin typeface="Arial"/>
+            </a:endParaRPr>
+          </a:p>
+          <a:p>
+            <a:pPr algn="just">
+              <a:lnSpc>
+                <a:spcPct val="100000"/>
+              </a:lnSpc>
+            </a:pPr>
             <a:endParaRPr b="0" lang="en-US" sz="1800" spc="-1" strike="noStrike">
               <a:solidFill>
                 <a:srgbClr val="000000"/>
@@ -2715,7 +2752,7 @@
         <p:spPr>
           <a:xfrm>
             <a:off x="0" y="365760"/>
-            <a:ext cx="30239640" cy="9269640"/>
+            <a:ext cx="30238560" cy="9268560"/>
           </a:xfrm>
           <a:prstGeom prst="rect">
             <a:avLst/>
@@ -2743,7 +2780,7 @@
         <p:spPr>
           <a:xfrm>
             <a:off x="0" y="-76320"/>
-            <a:ext cx="30239640" cy="3060000"/>
+            <a:ext cx="30238560" cy="3058920"/>
           </a:xfrm>
           <a:prstGeom prst="rect">
             <a:avLst/>
@@ -2764,16 +2801,10 @@
         <p:txBody>
           <a:bodyPr lIns="216000" rIns="216000" tIns="254880" bIns="180000" anchor="ctr" anchorCtr="1"/>
           <a:p>
-            <a:pPr marL="216000" indent="-215640">
+            <a:pPr algn="ctr">
               <a:lnSpc>
                 <a:spcPct val="100000"/>
               </a:lnSpc>
-              <a:buClr>
-                <a:srgbClr val="000000"/>
-              </a:buClr>
-              <a:buSzPct val="45000"/>
-              <a:buFont typeface="Wingdings" charset="2"/>
-              <a:buChar char=""/>
             </a:pPr>
             <a:r>
               <a:rPr b="1" lang="en-US" sz="8500" spc="-1" strike="noStrike">
@@ -2813,7 +2844,7 @@
         <p:spPr>
           <a:xfrm>
             <a:off x="152280" y="3067200"/>
-            <a:ext cx="29604960" cy="2046960"/>
+            <a:ext cx="29603880" cy="2045880"/>
           </a:xfrm>
           <a:prstGeom prst="rect">
             <a:avLst/>
@@ -2832,7 +2863,7 @@
         <p:txBody>
           <a:bodyPr lIns="180000" rIns="180000" tIns="222480" bIns="180000" anchor="ctr"/>
           <a:p>
-            <a:pPr algn="just">
+            <a:pPr algn="ctr">
               <a:lnSpc>
                 <a:spcPct val="93000"/>
               </a:lnSpc>
@@ -2940,7 +2971,7 @@
                 <a:latin typeface="Arial"/>
                 <a:ea typeface="Arial"/>
               </a:rPr>
-              <a:t>,  Davind Feng</a:t>
+              <a:t>,  David Feng</a:t>
             </a:r>
             <a:r>
               <a:rPr b="1" lang="en-US" sz="3600" spc="-1" strike="noStrike" baseline="30000">
@@ -2970,6 +3001,36 @@
                 <a:latin typeface="Arial"/>
                 <a:ea typeface="Arial"/>
               </a:rPr>
+              <a:t>, Valentin Demeusy</a:t>
+            </a:r>
+            <a:r>
+              <a:rPr b="1" lang="en-US" sz="3600" spc="-1" strike="noStrike" baseline="30000">
+                <a:solidFill>
+                  <a:srgbClr val="000000"/>
+                </a:solidFill>
+                <a:uFill>
+                  <a:solidFill>
+                    <a:srgbClr val="ffffff"/>
+                  </a:solidFill>
+                </a:uFill>
+                <a:latin typeface="Arial"/>
+                <a:ea typeface="Arial"/>
+              </a:rPr>
+              <a:t>15</a:t>
+            </a:r>
+            <a:r>
+              <a:rPr b="1" lang="en-US" sz="3600" spc="-1" strike="noStrike">
+                <a:solidFill>
+                  <a:srgbClr val="000000"/>
+                </a:solidFill>
+                <a:uFill>
+                  <a:solidFill>
+                    <a:srgbClr val="ffffff"/>
+                  </a:solidFill>
+                </a:uFill>
+                <a:latin typeface="Arial"/>
+                <a:ea typeface="Arial"/>
+              </a:rPr>
               <a:t>, Guillaume Flandin</a:t>
             </a:r>
             <a:r>
@@ -3030,7 +3091,40 @@
                 <a:latin typeface="Arial"/>
                 <a:ea typeface="Arial"/>
               </a:rPr>
-              <a:t>, Satra Ghosh</a:t>
+              <a:t>, </a:t>
+            </a:r>
+            <a:endParaRPr b="0" lang="en-US" sz="1800" spc="-1" strike="noStrike">
+              <a:solidFill>
+                <a:srgbClr val="000000"/>
+              </a:solidFill>
+              <a:uFill>
+                <a:solidFill>
+                  <a:srgbClr val="ffffff"/>
+                </a:solidFill>
+              </a:uFill>
+              <a:latin typeface="Arial"/>
+            </a:endParaRPr>
+          </a:p>
+          <a:p>
+            <a:pPr algn="ctr">
+              <a:lnSpc>
+                <a:spcPct val="93000"/>
+              </a:lnSpc>
+            </a:pPr>
+            <a:r>
+              <a:rPr b="1" lang="en-US" sz="3600" spc="-1" strike="noStrike">
+                <a:solidFill>
+                  <a:srgbClr val="000000"/>
+                </a:solidFill>
+                <a:uFill>
+                  <a:solidFill>
+                    <a:srgbClr val="ffffff"/>
+                  </a:solidFill>
+                </a:uFill>
+                <a:latin typeface="Arial"/>
+                <a:ea typeface="Arial"/>
+              </a:rPr>
+              <a:t>Satra Ghosh</a:t>
             </a:r>
             <a:r>
               <a:rPr b="1" lang="en-US" sz="3600" spc="-1" strike="noStrike" baseline="30000">
@@ -3060,6 +3154,66 @@
                 <a:latin typeface="Arial"/>
                 <a:ea typeface="Arial"/>
               </a:rPr>
+              <a:t>, David Glen</a:t>
+            </a:r>
+            <a:r>
+              <a:rPr b="1" lang="en-US" sz="3600" spc="-1" strike="noStrike" baseline="30000">
+                <a:solidFill>
+                  <a:srgbClr val="000000"/>
+                </a:solidFill>
+                <a:uFill>
+                  <a:solidFill>
+                    <a:srgbClr val="ffffff"/>
+                  </a:solidFill>
+                </a:uFill>
+                <a:latin typeface="Arial"/>
+                <a:ea typeface="Arial"/>
+              </a:rPr>
+              <a:t>16</a:t>
+            </a:r>
+            <a:r>
+              <a:rPr b="1" lang="en-US" sz="3600" spc="-1" strike="noStrike">
+                <a:solidFill>
+                  <a:srgbClr val="000000"/>
+                </a:solidFill>
+                <a:uFill>
+                  <a:solidFill>
+                    <a:srgbClr val="ffffff"/>
+                  </a:solidFill>
+                </a:uFill>
+                <a:latin typeface="Arial"/>
+                <a:ea typeface="Arial"/>
+              </a:rPr>
+              <a:t>, Michael Halle</a:t>
+            </a:r>
+            <a:r>
+              <a:rPr b="1" lang="en-US" sz="3600" spc="-1" strike="noStrike" baseline="30000">
+                <a:solidFill>
+                  <a:srgbClr val="000000"/>
+                </a:solidFill>
+                <a:uFill>
+                  <a:solidFill>
+                    <a:srgbClr val="ffffff"/>
+                  </a:solidFill>
+                </a:uFill>
+                <a:latin typeface="Arial"/>
+                <a:ea typeface="Arial"/>
+              </a:rPr>
+              <a:t>15</a:t>
+            </a:r>
+            <a:r>
+              <a:rPr b="1" lang="en-US" sz="3600" spc="-1" strike="noStrike">
+                <a:solidFill>
+                  <a:srgbClr val="000000"/>
+                </a:solidFill>
+                <a:uFill>
+                  <a:solidFill>
+                    <a:srgbClr val="ffffff"/>
+                  </a:solidFill>
+                </a:uFill>
+                <a:latin typeface="Arial"/>
+                <a:ea typeface="Arial"/>
+              </a:rPr>
               <a:t>, Andrew Janke</a:t>
             </a:r>
             <a:r>
@@ -3210,6 +3364,69 @@
                 <a:latin typeface="Arial"/>
                 <a:ea typeface="Arial"/>
               </a:rPr>
+              <a:t>, </a:t>
+            </a:r>
+            <a:endParaRPr b="0" lang="en-US" sz="1800" spc="-1" strike="noStrike">
+              <a:solidFill>
+                <a:srgbClr val="000000"/>
+              </a:solidFill>
+              <a:uFill>
+                <a:solidFill>
+                  <a:srgbClr val="ffffff"/>
+                </a:solidFill>
+              </a:uFill>
+              <a:latin typeface="Arial"/>
+            </a:endParaRPr>
+          </a:p>
+          <a:p>
+            <a:pPr algn="ctr">
+              <a:lnSpc>
+                <a:spcPct val="93000"/>
+              </a:lnSpc>
+            </a:pPr>
+            <a:r>
+              <a:rPr b="1" lang="en-US" sz="3600" spc="-1" strike="noStrike">
+                <a:solidFill>
+                  <a:srgbClr val="000000"/>
+                </a:solidFill>
+                <a:uFill>
+                  <a:solidFill>
+                    <a:srgbClr val="ffffff"/>
+                  </a:solidFill>
+                </a:uFill>
+                <a:latin typeface="Arial"/>
+                <a:ea typeface="Arial"/>
+              </a:rPr>
+              <a:t>Richard Reunolds</a:t>
+            </a:r>
+            <a:r>
+              <a:rPr b="1" lang="en-US" sz="3600" spc="-1" strike="noStrike" baseline="30000">
+                <a:solidFill>
+                  <a:srgbClr val="000000"/>
+                </a:solidFill>
+                <a:uFill>
+                  <a:solidFill>
+                    <a:srgbClr val="ffffff"/>
+                  </a:solidFill>
+                </a:uFill>
+                <a:latin typeface="Arial"/>
+                <a:ea typeface="Arial"/>
+              </a:rPr>
+              <a:t>16</a:t>
+            </a:r>
+            <a:r>
+              <a:rPr b="1" lang="en-US" sz="3600" spc="-1" strike="noStrike">
+                <a:solidFill>
+                  <a:srgbClr val="000000"/>
+                </a:solidFill>
+                <a:uFill>
+                  <a:solidFill>
+                    <a:srgbClr val="ffffff"/>
+                  </a:solidFill>
+                </a:uFill>
+                <a:latin typeface="Arial"/>
+                <a:ea typeface="Arial"/>
+              </a:rPr>
               <a:t>, Jason Tourville</a:t>
             </a:r>
             <a:r>
@@ -3255,7 +3472,7 @@
                 <a:latin typeface="Arial"/>
                 <a:ea typeface="Arial"/>
               </a:rPr>
-              <a:t>13</a:t>
+              <a:t>3</a:t>
             </a:r>
             <a:r>
               <a:rPr b="1" lang="en-US" sz="3600" spc="-1" strike="noStrike">
@@ -3310,7 +3527,7 @@
         <p:spPr>
           <a:xfrm>
             <a:off x="364320" y="4969800"/>
-            <a:ext cx="18111960" cy="4453920"/>
+            <a:ext cx="18110880" cy="4812840"/>
           </a:xfrm>
           <a:prstGeom prst="rect">
             <a:avLst/>
@@ -3362,7 +3579,7 @@
                 <a:latin typeface="Times New Roman"/>
                 <a:ea typeface="Times New Roman"/>
               </a:rPr>
-              <a:t>. University of California, Berkeley, Berkeley, CA, </a:t>
+              <a:t>. University of California, Berkeley, Berkeley, CA </a:t>
             </a:r>
             <a:r>
               <a:rPr b="1" lang="en-US" sz="3200" spc="-1" strike="noStrike">
@@ -3392,7 +3609,7 @@
                 <a:latin typeface="Times New Roman"/>
                 <a:ea typeface="Times New Roman"/>
               </a:rPr>
-              <a:t> Department of Health Sciences, Boston University, Boston, MA, </a:t>
+              <a:t> Department of Health Sciences, Boston University, Boston, MA </a:t>
             </a:r>
             <a:r>
               <a:rPr b="1" lang="en-US" sz="3200" spc="-1" strike="noStrike">
@@ -3425,7 +3642,7 @@
               <a:t> McGill Centre for Integrative Neuroscience, Montreal Neurological Institute, McGill University, Montreal, QC, </a:t>
             </a:r>
             <a:r>
-              <a:rPr b="1" lang="en-US" sz="3200" spc="-1" strike="noStrike">
+              <a:rPr b="0" lang="en-US" sz="3200" spc="-1" strike="noStrike">
                 <a:solidFill>
                   <a:srgbClr val="000000"/>
                 </a:solidFill>
@@ -3437,7 +3654,7 @@
                 <a:latin typeface="Times New Roman"/>
                 <a:ea typeface="Times New Roman"/>
               </a:rPr>
-              <a:t>4.</a:t>
+              <a:t>Canada</a:t>
             </a:r>
             <a:r>
               <a:rPr b="0" lang="en-US" sz="3200" spc="-1" strike="noStrike">
@@ -3452,7 +3669,7 @@
                 <a:latin typeface="Times New Roman"/>
                 <a:ea typeface="Times New Roman"/>
               </a:rPr>
-              <a:t> Allen Institute for Brain Science, Seattle, WA, </a:t>
+              <a:t> </a:t>
             </a:r>
             <a:r>
               <a:rPr b="1" lang="en-US" sz="3200" spc="-1" strike="noStrike">
@@ -3467,7 +3684,7 @@
                 <a:latin typeface="Times New Roman"/>
                 <a:ea typeface="Times New Roman"/>
               </a:rPr>
-              <a:t>5.</a:t>
+              <a:t>4.</a:t>
             </a:r>
             <a:r>
               <a:rPr b="0" lang="en-US" sz="3200" spc="-1" strike="noStrike">
@@ -3482,7 +3699,7 @@
                 <a:latin typeface="Times New Roman"/>
                 <a:ea typeface="Times New Roman"/>
               </a:rPr>
-              <a:t> Wellcome Trust Centre for Neuroimaging, London, United Kingdom, </a:t>
+              <a:t> Allen Institute for Brain Science, Seattle, WA, </a:t>
             </a:r>
             <a:r>
               <a:rPr b="1" lang="en-US" sz="3200" spc="-1" strike="noStrike">
@@ -3497,7 +3714,7 @@
                 <a:latin typeface="Times New Roman"/>
                 <a:ea typeface="Times New Roman"/>
               </a:rPr>
-              <a:t>6.</a:t>
+              <a:t>5.</a:t>
             </a:r>
             <a:r>
               <a:rPr b="0" lang="en-US" sz="3200" spc="-1" strike="noStrike">
@@ -3512,7 +3729,7 @@
                 <a:latin typeface="Times New Roman"/>
                 <a:ea typeface="Times New Roman"/>
               </a:rPr>
-              <a:t> Montreal Neurological Institute, McGill University, Montreal, Quebec, </a:t>
+              <a:t> Wellcome Trust Centre for Neuroimaging, London, UK </a:t>
             </a:r>
             <a:r>
               <a:rPr b="1" lang="en-US" sz="3200" spc="-1" strike="noStrike">
@@ -3527,7 +3744,7 @@
                 <a:latin typeface="Times New Roman"/>
                 <a:ea typeface="Times New Roman"/>
               </a:rPr>
-              <a:t>7.</a:t>
+              <a:t>6.</a:t>
             </a:r>
             <a:r>
               <a:rPr b="0" lang="en-US" sz="3200" spc="-1" strike="noStrike">
@@ -3542,7 +3759,7 @@
                 <a:latin typeface="Times New Roman"/>
                 <a:ea typeface="Times New Roman"/>
               </a:rPr>
-              <a:t> MIT, Cambridge, United States, </a:t>
+              <a:t> Montreal Neurological Institute, McGill University, Montreal, Quebec, </a:t>
             </a:r>
             <a:r>
               <a:rPr b="1" lang="en-US" sz="3200" spc="-1" strike="noStrike">
@@ -3557,7 +3774,7 @@
                 <a:latin typeface="Times New Roman"/>
                 <a:ea typeface="Times New Roman"/>
               </a:rPr>
-              <a:t>8.</a:t>
+              <a:t>7.</a:t>
             </a:r>
             <a:r>
               <a:rPr b="0" lang="en-US" sz="3200" spc="-1" strike="noStrike">
@@ -3572,7 +3789,7 @@
                 <a:latin typeface="Times New Roman"/>
                 <a:ea typeface="Times New Roman"/>
               </a:rPr>
-              <a:t> Centre for Advanced Imaging, University of Queensland, Brisbane, Australia, </a:t>
+              <a:t> MIT, Cambridge, United States, </a:t>
             </a:r>
             <a:r>
               <a:rPr b="1" lang="en-US" sz="3200" spc="-1" strike="noStrike">
@@ -3587,7 +3804,7 @@
                 <a:latin typeface="Times New Roman"/>
                 <a:ea typeface="Times New Roman"/>
               </a:rPr>
-              <a:t>9.</a:t>
+              <a:t>8.</a:t>
             </a:r>
             <a:r>
               <a:rPr b="0" lang="en-US" sz="3200" spc="-1" strike="noStrike">
@@ -3602,7 +3819,7 @@
                 <a:latin typeface="Times New Roman"/>
                 <a:ea typeface="Times New Roman"/>
               </a:rPr>
-              <a:t> Oxford University, Oxford, United Kingdom, </a:t>
+              <a:t> Centre for Advanced Imaging, University of Queensland, Brisbane, Australia, </a:t>
             </a:r>
             <a:r>
               <a:rPr b="1" lang="en-US" sz="3200" spc="-1" strike="noStrike">
@@ -3617,7 +3834,7 @@
                 <a:latin typeface="Times New Roman"/>
                 <a:ea typeface="Times New Roman"/>
               </a:rPr>
-              <a:t>10.</a:t>
+              <a:t>9.</a:t>
             </a:r>
             <a:r>
               <a:rPr b="0" lang="en-US" sz="3200" spc="-1" strike="noStrike">
@@ -3632,7 +3849,7 @@
                 <a:latin typeface="Times New Roman"/>
                 <a:ea typeface="Times New Roman"/>
               </a:rPr>
-              <a:t> University of Massachusetts Medical School, Worcester, MA, </a:t>
+              <a:t> Oxford University, Oxford, United Kingdom, </a:t>
             </a:r>
             <a:r>
               <a:rPr b="1" lang="en-US" sz="3200" spc="-1" strike="noStrike">
@@ -3647,7 +3864,7 @@
                 <a:latin typeface="Times New Roman"/>
                 <a:ea typeface="Times New Roman"/>
               </a:rPr>
-              <a:t>11.</a:t>
+              <a:t>10.</a:t>
             </a:r>
             <a:r>
               <a:rPr b="0" lang="en-US" sz="3200" spc="-1" strike="noStrike">
@@ -3662,7 +3879,7 @@
                 <a:latin typeface="Times New Roman"/>
                 <a:ea typeface="Times New Roman"/>
               </a:rPr>
-              <a:t> University of Toronto/Hospital for Sick Children, Toronto, Ontario, </a:t>
+              <a:t> Univ. of Massachusetts Medical School, Worcester, MA, USA </a:t>
             </a:r>
             <a:r>
               <a:rPr b="1" lang="en-US" sz="3200" spc="-1" strike="noStrike">
@@ -3677,7 +3894,7 @@
                 <a:latin typeface="Times New Roman"/>
                 <a:ea typeface="Times New Roman"/>
               </a:rPr>
-              <a:t>12.</a:t>
+              <a:t>11.</a:t>
             </a:r>
             <a:r>
               <a:rPr b="0" lang="en-US" sz="3200" spc="-1" strike="noStrike">
@@ -3692,7 +3909,7 @@
                 <a:latin typeface="Times New Roman"/>
                 <a:ea typeface="Times New Roman"/>
               </a:rPr>
-              <a:t> Department of Speech, Language, &amp; Hearing Sciences, Boston University, Boston, MA, </a:t>
+              <a:t> Univ. of Toronto/Hospital for Sick Children, Toronto, Ontario </a:t>
             </a:r>
             <a:r>
               <a:rPr b="1" lang="en-US" sz="3200" spc="-1" strike="noStrike">
@@ -3707,7 +3924,7 @@
                 <a:latin typeface="Times New Roman"/>
                 <a:ea typeface="Times New Roman"/>
               </a:rPr>
-              <a:t>13.</a:t>
+              <a:t>12.</a:t>
             </a:r>
             <a:r>
               <a:rPr b="0" lang="en-US" sz="3200" spc="-1" strike="noStrike">
@@ -3722,7 +3939,7 @@
                 <a:latin typeface="Times New Roman"/>
                 <a:ea typeface="Times New Roman"/>
               </a:rPr>
-              <a:t> McGill Centre for Integrative Neuroscience, Montreal Neurological Institute, McGill University, Montreal, Canada, </a:t>
+              <a:t> Department of Speech, Language, &amp; Hearing Sciences, Boston University, Boston, MA </a:t>
             </a:r>
             <a:r>
               <a:rPr b="1" lang="en-US" sz="3200" spc="-1" strike="noStrike">
@@ -3752,7 +3969,67 @@
                 <a:latin typeface="Times New Roman"/>
                 <a:ea typeface="Times New Roman"/>
               </a:rPr>
-              <a:t> Massachusetts General Hospital, Boston, United States.</a:t>
+              <a:t> Massachusetts General Hospital, Boston, USA </a:t>
+            </a:r>
+            <a:r>
+              <a:rPr b="1" lang="en-US" sz="3200" spc="-1" strike="noStrike">
+                <a:solidFill>
+                  <a:srgbClr val="000000"/>
+                </a:solidFill>
+                <a:uFill>
+                  <a:solidFill>
+                    <a:srgbClr val="ffffff"/>
+                  </a:solidFill>
+                </a:uFill>
+                <a:latin typeface="Times New Roman"/>
+                <a:ea typeface="Times New Roman"/>
+              </a:rPr>
+              <a:t>15.</a:t>
+            </a:r>
+            <a:r>
+              <a:rPr b="0" lang="en-US" sz="3200" spc="-1" strike="noStrike">
+                <a:solidFill>
+                  <a:srgbClr val="000000"/>
+                </a:solidFill>
+                <a:uFill>
+                  <a:solidFill>
+                    <a:srgbClr val="ffffff"/>
+                  </a:solidFill>
+                </a:uFill>
+                <a:latin typeface="Times New Roman"/>
+                <a:ea typeface="Times New Roman"/>
+              </a:rPr>
+              <a:t> Harvard Medical School, United States. </a:t>
+            </a:r>
+            <a:r>
+              <a:rPr b="1" lang="en-US" sz="3200" spc="-1" strike="noStrike">
+                <a:solidFill>
+                  <a:srgbClr val="000000"/>
+                </a:solidFill>
+                <a:uFill>
+                  <a:solidFill>
+                    <a:srgbClr val="ffffff"/>
+                  </a:solidFill>
+                </a:uFill>
+                <a:latin typeface="Times New Roman"/>
+                <a:ea typeface="Times New Roman"/>
+              </a:rPr>
+              <a:t>16. </a:t>
+            </a:r>
+            <a:r>
+              <a:rPr b="0" lang="en-US" sz="3200" spc="-1" strike="noStrike">
+                <a:solidFill>
+                  <a:srgbClr val="000000"/>
+                </a:solidFill>
+                <a:uFill>
+                  <a:solidFill>
+                    <a:srgbClr val="ffffff"/>
+                  </a:solidFill>
+                </a:uFill>
+                <a:latin typeface="Times New Roman"/>
+                <a:ea typeface="Times New Roman"/>
+              </a:rPr>
+              <a:t>National Institute of Health, Bethesda, USA.</a:t>
             </a:r>
             <a:endParaRPr b="0" lang="en-US" sz="1800" spc="-1" strike="noStrike">
               <a:solidFill>
@@ -3770,7 +4047,7 @@
       </p:sp>
       <p:pic>
         <p:nvPicPr>
-          <p:cNvPr id="51" name="Shape 54" descr=""/>
+          <p:cNvPr id="51" name="Shape 70" descr=""/>
           <p:cNvPicPr/>
           <p:nvPr/>
         </p:nvPicPr>
@@ -3781,7 +4058,7 @@
         <p:spPr>
           <a:xfrm>
             <a:off x="18719640" y="4809960"/>
-            <a:ext cx="10848240" cy="1875960"/>
+            <a:ext cx="10847160" cy="1874880"/>
           </a:xfrm>
           <a:prstGeom prst="rect">
             <a:avLst/>
@@ -3800,7 +4077,7 @@
         <p:spPr>
           <a:xfrm>
             <a:off x="254160" y="11064240"/>
-            <a:ext cx="14741640" cy="11886840"/>
+            <a:ext cx="14741640" cy="7589160"/>
           </a:xfrm>
           <a:prstGeom prst="rect">
             <a:avLst/>
@@ -4046,7 +4323,7 @@
                 <a:latin typeface="Arial"/>
                 <a:ea typeface="Arial"/>
               </a:rPr>
-              <a:t>- anatomical-T1, </a:t>
+              <a:t>- anatomical-T1/diffusion, </a:t>
             </a:r>
             <a:endParaRPr b="0" lang="en-US" sz="1800" spc="-1" strike="noStrike">
               <a:solidFill>
@@ -4094,7 +4371,7 @@
                 <a:latin typeface="Arial"/>
                 <a:ea typeface="Arial"/>
               </a:rPr>
-              <a:t>- anatomical-diffusion,</a:t>
+              <a:t>- functional-Bold/connectivity, </a:t>
             </a:r>
             <a:endParaRPr b="0" lang="en-US" sz="1800" spc="-1" strike="noStrike">
               <a:solidFill>
@@ -4142,7 +4419,7 @@
                 <a:latin typeface="Arial"/>
                 <a:ea typeface="Arial"/>
               </a:rPr>
-              <a:t>- anatomical-functional-Bold, </a:t>
+              <a:t>- genetic (eg  Allen-brain), and many more.</a:t>
             </a:r>
             <a:endParaRPr b="0" lang="en-US" sz="1800" spc="-1" strike="noStrike">
               <a:solidFill>
@@ -4175,7 +4452,22 @@
                 <a:latin typeface="Arial"/>
                 <a:ea typeface="Arial"/>
               </a:rPr>
-              <a:t>	</a:t>
+              <a:t>* We often need to investigate </a:t>
+            </a:r>
+            <a:r>
+              <a:rPr b="1" lang="en-US" sz="4000" spc="-1" strike="noStrike">
+                <a:solidFill>
+                  <a:srgbClr val="000000"/>
+                </a:solidFill>
+                <a:uFill>
+                  <a:solidFill>
+                    <a:srgbClr val="ffffff"/>
+                  </a:solidFill>
+                </a:uFill>
+                <a:latin typeface="Arial"/>
+                <a:ea typeface="Arial"/>
+              </a:rPr>
+              <a:t>the correspondence between several atlases</a:t>
             </a:r>
             <a:r>
               <a:rPr b="0" lang="en-US" sz="4000" spc="-1" strike="noStrike">
@@ -4190,7 +4482,7 @@
                 <a:latin typeface="Arial"/>
                 <a:ea typeface="Arial"/>
               </a:rPr>
-              <a:t>- functional-connectivity, </a:t>
+              <a:t> </a:t>
             </a:r>
             <a:endParaRPr b="0" lang="en-US" sz="1800" spc="-1" strike="noStrike">
               <a:solidFill>
@@ -4223,7 +4515,22 @@
                 <a:latin typeface="Arial"/>
                 <a:ea typeface="Arial"/>
               </a:rPr>
-              <a:t>	</a:t>
+              <a:t>* However, the </a:t>
+            </a:r>
+            <a:r>
+              <a:rPr b="1" lang="en-US" sz="4000" spc="-1" strike="noStrike">
+                <a:solidFill>
+                  <a:srgbClr val="000000"/>
+                </a:solidFill>
+                <a:uFill>
+                  <a:solidFill>
+                    <a:srgbClr val="ffffff"/>
+                  </a:solidFill>
+                </a:uFill>
+                <a:latin typeface="Arial"/>
+                <a:ea typeface="Arial"/>
+              </a:rPr>
+              <a:t>meta data of atlases are formated in many ways</a:t>
             </a:r>
             <a:r>
               <a:rPr b="0" lang="en-US" sz="4000" spc="-1" strike="noStrike">
@@ -4238,7 +4545,7 @@
                 <a:latin typeface="Arial"/>
                 <a:ea typeface="Arial"/>
               </a:rPr>
-              <a:t>- genetic (eg  Allen-brain), and many more.</a:t>
+              <a:t>. Format are associated with specific tools. </a:t>
             </a:r>
             <a:endParaRPr b="0" lang="en-US" sz="1800" spc="-1" strike="noStrike">
               <a:solidFill>
@@ -4258,51 +4565,6 @@
                 <a:spcPct val="100000"/>
               </a:lnSpc>
             </a:pPr>
-            <a:r>
-              <a:rPr b="0" lang="en-US" sz="4000" spc="-1" strike="noStrike">
-                <a:solidFill>
-                  <a:srgbClr val="000000"/>
-                </a:solidFill>
-                <a:uFill>
-                  <a:solidFill>
-                    <a:srgbClr val="ffffff"/>
-                  </a:solidFill>
-                </a:uFill>
-                <a:latin typeface="Arial"/>
-                <a:ea typeface="Arial"/>
-              </a:rPr>
-              <a:t>* We often need to investigate </a:t>
-            </a:r>
-            <a:r>
-              <a:rPr b="1" lang="en-US" sz="4000" spc="-1" strike="noStrike">
-                <a:solidFill>
-                  <a:srgbClr val="000000"/>
-                </a:solidFill>
-                <a:uFill>
-                  <a:solidFill>
-                    <a:srgbClr val="ffffff"/>
-                  </a:solidFill>
-                </a:uFill>
-                <a:latin typeface="Arial"/>
-                <a:ea typeface="Arial"/>
-              </a:rPr>
-              <a:t>the correspondence between several atlases</a:t>
-            </a:r>
-            <a:r>
-              <a:rPr b="0" lang="en-US" sz="4000" spc="-1" strike="noStrike">
-                <a:solidFill>
-                  <a:srgbClr val="000000"/>
-                </a:solidFill>
-                <a:uFill>
-                  <a:solidFill>
-                    <a:srgbClr val="ffffff"/>
-                  </a:solidFill>
-                </a:uFill>
-                <a:latin typeface="Arial"/>
-                <a:ea typeface="Arial"/>
-              </a:rPr>
-              <a:t> </a:t>
-            </a:r>
             <a:endParaRPr b="0" lang="en-US" sz="1800" spc="-1" strike="noStrike">
               <a:solidFill>
                 <a:srgbClr val="000000"/>
@@ -4321,132 +4583,6 @@
                 <a:spcPct val="100000"/>
               </a:lnSpc>
             </a:pPr>
-            <a:r>
-              <a:rPr b="0" lang="en-US" sz="4000" spc="-1" strike="noStrike">
-                <a:solidFill>
-                  <a:srgbClr val="000000"/>
-                </a:solidFill>
-                <a:uFill>
-                  <a:solidFill>
-                    <a:srgbClr val="ffffff"/>
-                  </a:solidFill>
-                </a:uFill>
-                <a:latin typeface="Arial"/>
-                <a:ea typeface="Arial"/>
-              </a:rPr>
-              <a:t>* However, the </a:t>
-            </a:r>
-            <a:r>
-              <a:rPr b="1" lang="en-US" sz="4000" spc="-1" strike="noStrike">
-                <a:solidFill>
-                  <a:srgbClr val="000000"/>
-                </a:solidFill>
-                <a:uFill>
-                  <a:solidFill>
-                    <a:srgbClr val="ffffff"/>
-                  </a:solidFill>
-                </a:uFill>
-                <a:latin typeface="Arial"/>
-                <a:ea typeface="Arial"/>
-              </a:rPr>
-              <a:t>meta data of atlases are formated in many ways</a:t>
-            </a:r>
-            <a:r>
-              <a:rPr b="0" lang="en-US" sz="4000" spc="-1" strike="noStrike">
-                <a:solidFill>
-                  <a:srgbClr val="000000"/>
-                </a:solidFill>
-                <a:uFill>
-                  <a:solidFill>
-                    <a:srgbClr val="ffffff"/>
-                  </a:solidFill>
-                </a:uFill>
-                <a:latin typeface="Arial"/>
-                <a:ea typeface="Arial"/>
-              </a:rPr>
-              <a:t>. Format are associated with specific tools. </a:t>
-            </a:r>
-            <a:endParaRPr b="0" lang="en-US" sz="1800" spc="-1" strike="noStrike">
-              <a:solidFill>
-                <a:srgbClr val="000000"/>
-              </a:solidFill>
-              <a:uFill>
-                <a:solidFill>
-                  <a:srgbClr val="ffffff"/>
-                </a:solidFill>
-              </a:uFill>
-              <a:latin typeface="Arial"/>
-            </a:endParaRPr>
-          </a:p>
-          <a:p>
-            <a:pPr algn="just">
-              <a:lnSpc>
-                <a:spcPct val="100000"/>
-              </a:lnSpc>
-            </a:pPr>
-            <a:endParaRPr b="0" lang="en-US" sz="1800" spc="-1" strike="noStrike">
-              <a:solidFill>
-                <a:srgbClr val="000000"/>
-              </a:solidFill>
-              <a:uFill>
-                <a:solidFill>
-                  <a:srgbClr val="ffffff"/>
-                </a:solidFill>
-              </a:uFill>
-              <a:latin typeface="Arial"/>
-            </a:endParaRPr>
-          </a:p>
-          <a:p>
-            <a:pPr algn="just">
-              <a:lnSpc>
-                <a:spcPct val="100000"/>
-              </a:lnSpc>
-            </a:pPr>
-            <a:r>
-              <a:rPr b="0" lang="en-US" sz="4000" spc="-1" strike="noStrike">
-                <a:solidFill>
-                  <a:srgbClr val="000000"/>
-                </a:solidFill>
-                <a:uFill>
-                  <a:solidFill>
-                    <a:srgbClr val="ffffff"/>
-                  </a:solidFill>
-                </a:uFill>
-                <a:latin typeface="Arial"/>
-                <a:ea typeface="Arial"/>
-              </a:rPr>
-              <a:t>Conclusion: if we want to be </a:t>
-            </a:r>
-            <a:r>
-              <a:rPr b="1" lang="en-US" sz="4000" spc="-1" strike="noStrike">
-                <a:solidFill>
-                  <a:srgbClr val="000000"/>
-                </a:solidFill>
-                <a:uFill>
-                  <a:solidFill>
-                    <a:srgbClr val="ffffff"/>
-                  </a:solidFill>
-                </a:uFill>
-                <a:latin typeface="Arial"/>
-                <a:ea typeface="Arial"/>
-              </a:rPr>
-              <a:t>efficient, avoid errors, and facilitate conceptualization</a:t>
-            </a:r>
-            <a:r>
-              <a:rPr b="0" lang="en-US" sz="4000" spc="-1" strike="noStrike">
-                <a:solidFill>
-                  <a:srgbClr val="000000"/>
-                </a:solidFill>
-                <a:uFill>
-                  <a:solidFill>
-                    <a:srgbClr val="ffffff"/>
-                  </a:solidFill>
-                </a:uFill>
-                <a:latin typeface="Arial"/>
-                <a:ea typeface="Arial"/>
-              </a:rPr>
-              <a:t> of the field of atlasing, we would need a common format and some reference implementation to read and write atlases in this format. </a:t>
-            </a:r>
             <a:endParaRPr b="0" lang="en-US" sz="1800" spc="-1" strike="noStrike">
               <a:solidFill>
                 <a:srgbClr val="000000"/>
@@ -4470,7 +4606,7 @@
         <p:spPr>
           <a:xfrm>
             <a:off x="254160" y="9864720"/>
-            <a:ext cx="14759280" cy="1199160"/>
+            <a:ext cx="14758200" cy="1198080"/>
           </a:xfrm>
           <a:prstGeom prst="rect">
             <a:avLst/>
@@ -4536,8 +4672,8 @@
         </p:nvSpPr>
         <p:spPr>
           <a:xfrm>
-            <a:off x="236520" y="23275440"/>
-            <a:ext cx="14759280" cy="881280"/>
+            <a:off x="236520" y="25183440"/>
+            <a:ext cx="14758200" cy="880200"/>
           </a:xfrm>
           <a:prstGeom prst="rect">
             <a:avLst/>
@@ -4603,8 +4739,8 @@
         </p:nvSpPr>
         <p:spPr>
           <a:xfrm>
-            <a:off x="254160" y="24231600"/>
-            <a:ext cx="14759280" cy="13178520"/>
+            <a:off x="254160" y="26139600"/>
+            <a:ext cx="14758200" cy="11429640"/>
           </a:xfrm>
           <a:prstGeom prst="rect">
             <a:avLst/>
@@ -5042,8 +5178,8 @@
         </p:nvSpPr>
         <p:spPr>
           <a:xfrm>
-            <a:off x="15425280" y="21115800"/>
-            <a:ext cx="14505840" cy="882000"/>
+            <a:off x="15425280" y="19207800"/>
+            <a:ext cx="14504760" cy="880920"/>
           </a:xfrm>
           <a:prstGeom prst="rect">
             <a:avLst/>
@@ -5110,7 +5246,7 @@
         <p:spPr>
           <a:xfrm>
             <a:off x="0" y="0"/>
-            <a:ext cx="2999520" cy="2999520"/>
+            <a:ext cx="2998440" cy="2998440"/>
           </a:xfrm>
           <a:prstGeom prst="rect">
             <a:avLst/>
@@ -5136,7 +5272,7 @@
         <p:spPr>
           <a:xfrm>
             <a:off x="254160" y="38341440"/>
-            <a:ext cx="14759280" cy="4152240"/>
+            <a:ext cx="14758200" cy="4151160"/>
           </a:xfrm>
           <a:prstGeom prst="rect">
             <a:avLst/>
@@ -5178,7 +5314,172 @@
                 <a:latin typeface="Arial"/>
                 <a:ea typeface="Arial"/>
               </a:rPr>
-              <a:t>[0] J.B. Poline, J. Breeze, S. Ghosh, et al., Frontiers in Neuroinformatics (2012). [1] AC Evans, AL Janke, DL Collins, S Baillet, “Brain templates and atlases”, Neuroimage, 2012. [2] http://fsl.fmrib.ox.ac.uk/fsl/fslwiki/Atlases. [3] https://en.wikibooks.org/wiki/SPM/Atlases. [4] JT Devlin, RA Poldrack, “In praise of tedious anatomy”, Neuroimage, 2006. [5] Amunts, K., Hawrylycz, M.J., Van Essen, D.C. et al. (2014). Interoperable atlases of the human brain. Neuroimage 99, 525–532. [6] JW Bohland, H Bokil, CB Allen, PP Mitra, “The Brain Atlas Concordance Problem: Quantitative Comparison of Anatomical Parcellations”, PLOS ONE, 2009. </a:t>
+              <a:t>[1] AC Evans, AL Janke, DL Collins, S Baillet, “Brain templates and atlases”, Neuroimage, 2012. [2] http://fsl.fmrib.ox.ac.uk/fsl/fslwiki/Atlases. </a:t>
+            </a:r>
+            <a:endParaRPr b="0" lang="en-US" sz="1800" spc="-1" strike="noStrike">
+              <a:solidFill>
+                <a:srgbClr val="000000"/>
+              </a:solidFill>
+              <a:uFill>
+                <a:solidFill>
+                  <a:srgbClr val="ffffff"/>
+                </a:solidFill>
+              </a:uFill>
+              <a:latin typeface="Arial"/>
+            </a:endParaRPr>
+          </a:p>
+          <a:p>
+            <a:pPr algn="just">
+              <a:lnSpc>
+                <a:spcPct val="100000"/>
+              </a:lnSpc>
+            </a:pPr>
+            <a:r>
+              <a:rPr b="0" lang="en-US" sz="2700" spc="-1" strike="noStrike">
+                <a:solidFill>
+                  <a:srgbClr val="000000"/>
+                </a:solidFill>
+                <a:uFill>
+                  <a:solidFill>
+                    <a:srgbClr val="ffffff"/>
+                  </a:solidFill>
+                </a:uFill>
+                <a:latin typeface="Arial"/>
+                <a:ea typeface="Arial"/>
+              </a:rPr>
+              <a:t>[3] https://en.wikibooks.org/wiki/SPM/Atlases. </a:t>
+            </a:r>
+            <a:endParaRPr b="0" lang="en-US" sz="1800" spc="-1" strike="noStrike">
+              <a:solidFill>
+                <a:srgbClr val="000000"/>
+              </a:solidFill>
+              <a:uFill>
+                <a:solidFill>
+                  <a:srgbClr val="ffffff"/>
+                </a:solidFill>
+              </a:uFill>
+              <a:latin typeface="Arial"/>
+            </a:endParaRPr>
+          </a:p>
+          <a:p>
+            <a:pPr algn="just">
+              <a:lnSpc>
+                <a:spcPct val="100000"/>
+              </a:lnSpc>
+            </a:pPr>
+            <a:r>
+              <a:rPr b="0" lang="en-US" sz="2700" spc="-1" strike="noStrike">
+                <a:solidFill>
+                  <a:srgbClr val="000000"/>
+                </a:solidFill>
+                <a:uFill>
+                  <a:solidFill>
+                    <a:srgbClr val="ffffff"/>
+                  </a:solidFill>
+                </a:uFill>
+                <a:latin typeface="Arial"/>
+                <a:ea typeface="Arial"/>
+              </a:rPr>
+              <a:t>[4] JT Devlin, RA Poldrack, “In praise of tedious anatomy”, Neuroimage, 2006. </a:t>
+            </a:r>
+            <a:endParaRPr b="0" lang="en-US" sz="1800" spc="-1" strike="noStrike">
+              <a:solidFill>
+                <a:srgbClr val="000000"/>
+              </a:solidFill>
+              <a:uFill>
+                <a:solidFill>
+                  <a:srgbClr val="ffffff"/>
+                </a:solidFill>
+              </a:uFill>
+              <a:latin typeface="Arial"/>
+            </a:endParaRPr>
+          </a:p>
+          <a:p>
+            <a:pPr algn="just">
+              <a:lnSpc>
+                <a:spcPct val="100000"/>
+              </a:lnSpc>
+            </a:pPr>
+            <a:r>
+              <a:rPr b="0" lang="en-US" sz="2700" spc="-1" strike="noStrike">
+                <a:solidFill>
+                  <a:srgbClr val="000000"/>
+                </a:solidFill>
+                <a:uFill>
+                  <a:solidFill>
+                    <a:srgbClr val="ffffff"/>
+                  </a:solidFill>
+                </a:uFill>
+                <a:latin typeface="Arial"/>
+                <a:ea typeface="Arial"/>
+              </a:rPr>
+              <a:t>[5] Amunts, K., Hawrylycz, M.J., Van Essen, D.C. et al. Interoperable atlases of the human brain. Neuroimage 99, 525–532, 2014. </a:t>
+            </a:r>
+            <a:endParaRPr b="0" lang="en-US" sz="1800" spc="-1" strike="noStrike">
+              <a:solidFill>
+                <a:srgbClr val="000000"/>
+              </a:solidFill>
+              <a:uFill>
+                <a:solidFill>
+                  <a:srgbClr val="ffffff"/>
+                </a:solidFill>
+              </a:uFill>
+              <a:latin typeface="Arial"/>
+            </a:endParaRPr>
+          </a:p>
+          <a:p>
+            <a:pPr algn="just">
+              <a:lnSpc>
+                <a:spcPct val="100000"/>
+              </a:lnSpc>
+            </a:pPr>
+            <a:r>
+              <a:rPr b="0" lang="en-US" sz="2700" spc="-1" strike="noStrike">
+                <a:solidFill>
+                  <a:srgbClr val="000000"/>
+                </a:solidFill>
+                <a:uFill>
+                  <a:solidFill>
+                    <a:srgbClr val="ffffff"/>
+                  </a:solidFill>
+                </a:uFill>
+                <a:latin typeface="Arial"/>
+                <a:ea typeface="Arial"/>
+              </a:rPr>
+              <a:t>[6] JW Bohland, H Bokil, CB Allen, PP Mitra, “The Brain Atlas Concordance Problem: Quantitative Comparison of Anatomical Parcellations”, PLOS ONE, 2009. </a:t>
+            </a:r>
+            <a:endParaRPr b="0" lang="en-US" sz="1800" spc="-1" strike="noStrike">
+              <a:solidFill>
+                <a:srgbClr val="000000"/>
+              </a:solidFill>
+              <a:uFill>
+                <a:solidFill>
+                  <a:srgbClr val="ffffff"/>
+                </a:solidFill>
+              </a:uFill>
+              <a:latin typeface="Arial"/>
+            </a:endParaRPr>
+          </a:p>
+          <a:p>
+            <a:pPr algn="just">
+              <a:lnSpc>
+                <a:spcPct val="100000"/>
+              </a:lnSpc>
+            </a:pPr>
+            <a:r>
+              <a:rPr b="0" lang="en-US" sz="2700" spc="-1" strike="noStrike">
+                <a:solidFill>
+                  <a:srgbClr val="000000"/>
+                </a:solidFill>
+                <a:uFill>
+                  <a:solidFill>
+                    <a:srgbClr val="ffffff"/>
+                  </a:solidFill>
+                </a:uFill>
+                <a:latin typeface="Arial"/>
+                <a:ea typeface="Arial"/>
+              </a:rPr>
+              <a:t>[7] J.B. Poline, J. Breeze, S. Ghosh, et al., Frontiers in Neuroinformatics 2012.</a:t>
             </a:r>
             <a:endParaRPr b="0" lang="en-US" sz="1800" spc="-1" strike="noStrike">
               <a:solidFill>
@@ -5203,7 +5504,7 @@
         <p:spPr>
           <a:xfrm>
             <a:off x="15432480" y="36508680"/>
-            <a:ext cx="14468400" cy="5919480"/>
+            <a:ext cx="14467320" cy="5918400"/>
           </a:xfrm>
           <a:prstGeom prst="rect">
             <a:avLst/>
@@ -5293,7 +5594,7 @@
                 <a:latin typeface="Arial"/>
                 <a:ea typeface="Arial"/>
               </a:rPr>
-              <a:t>SPM, FSL, AFNI, FreeSurfer, Montreal Neurological Institute tools, Allen Brain Atlas tools, etc.</a:t>
+              <a:t>SPM, FSL, AFNI, FreeSurfer, Montreal Neurological Institute tools, Allen Brain Atlas tools, and many others.</a:t>
             </a:r>
             <a:endParaRPr b="0" lang="en-US" sz="1800" spc="-1" strike="noStrike">
               <a:solidFill>
@@ -5513,7 +5814,7 @@
         <p:spPr>
           <a:xfrm>
             <a:off x="15432480" y="35395920"/>
-            <a:ext cx="14505840" cy="1058760"/>
+            <a:ext cx="14504760" cy="1057680"/>
           </a:xfrm>
           <a:prstGeom prst="rect">
             <a:avLst/>
@@ -5579,85 +5880,8 @@
         </p:nvSpPr>
         <p:spPr>
           <a:xfrm>
-            <a:off x="18818280" y="6740640"/>
-            <a:ext cx="11067120" cy="2585160"/>
-          </a:xfrm>
-          <a:prstGeom prst="rect">
-            <a:avLst/>
-          </a:prstGeom>
-          <a:noFill/>
-          <a:ln>
-            <a:noFill/>
-          </a:ln>
-        </p:spPr>
-        <p:style>
-          <a:lnRef idx="0"/>
-          <a:fillRef idx="0"/>
-          <a:effectRef idx="0"/>
-          <a:fontRef idx="minor"/>
-        </p:style>
-        <p:txBody>
-          <a:bodyPr lIns="90000" rIns="90000" tIns="91440" bIns="91440" anchor="ctr"/>
-          <a:p>
-            <a:pPr>
-              <a:lnSpc>
-                <a:spcPct val="100000"/>
-              </a:lnSpc>
-            </a:pPr>
-            <a:r>
-              <a:rPr b="0" lang="en-US" sz="2400" spc="-1" strike="noStrike" u="sng">
-                <a:solidFill>
-                  <a:srgbClr val="000000"/>
-                </a:solidFill>
-                <a:uFill>
-                  <a:solidFill>
-                    <a:srgbClr val="ffffff"/>
-                  </a:solidFill>
-                </a:uFill>
-                <a:latin typeface="Arial"/>
-                <a:ea typeface="Arial"/>
-              </a:rPr>
-              <a:t>Acknowledgments:</a:t>
-            </a:r>
-            <a:r>
-              <a:rPr b="0" lang="en-US" sz="2400" spc="-1" strike="noStrike">
-                <a:solidFill>
-                  <a:srgbClr val="000000"/>
-                </a:solidFill>
-                <a:uFill>
-                  <a:solidFill>
-                    <a:srgbClr val="ffffff"/>
-                  </a:solidFill>
-                </a:uFill>
-                <a:latin typeface="Arial"/>
-                <a:ea typeface="Arial"/>
-              </a:rPr>
-              <a:t> We would like to acknowledge the work of all the INCF task force members as well as of many other colleagues who have helped the task force. We are particularly indebted to Mathew Abrams, Linda Lanyon, Roman Valls Guimera and Sean Hill for their support at the INCF.   </a:t>
-            </a:r>
-            <a:endParaRPr b="0" lang="en-US" sz="1800" spc="-1" strike="noStrike">
-              <a:solidFill>
-                <a:srgbClr val="000000"/>
-              </a:solidFill>
-              <a:uFill>
-                <a:solidFill>
-                  <a:srgbClr val="ffffff"/>
-                </a:solidFill>
-              </a:uFill>
-              <a:latin typeface="Arial"/>
-            </a:endParaRPr>
-          </a:p>
-        </p:txBody>
-      </p:sp>
-      <p:sp>
-        <p:nvSpPr>
-          <p:cNvPr id="62" name="CustomShape 16"/>
-          <p:cNvSpPr/>
-          <p:nvPr/>
-        </p:nvSpPr>
-        <p:spPr>
-          <a:xfrm>
             <a:off x="254160" y="37613160"/>
-            <a:ext cx="14759280" cy="880560"/>
+            <a:ext cx="14758200" cy="879480"/>
           </a:xfrm>
           <a:prstGeom prst="rect">
             <a:avLst/>
@@ -5717,14 +5941,14 @@
       </p:sp>
       <p:sp>
         <p:nvSpPr>
-          <p:cNvPr id="63" name="CustomShape 17"/>
+          <p:cNvPr id="62" name="CustomShape 16"/>
           <p:cNvSpPr/>
           <p:nvPr/>
         </p:nvSpPr>
         <p:spPr>
           <a:xfrm>
             <a:off x="15453360" y="9875520"/>
-            <a:ext cx="14538600" cy="1096920"/>
+            <a:ext cx="14537520" cy="1095840"/>
           </a:xfrm>
           <a:prstGeom prst="rect">
             <a:avLst/>
@@ -5784,14 +6008,14 @@
       </p:sp>
       <p:sp>
         <p:nvSpPr>
-          <p:cNvPr id="64" name="CustomShape 18"/>
+          <p:cNvPr id="63" name="CustomShape 17"/>
           <p:cNvSpPr/>
           <p:nvPr/>
         </p:nvSpPr>
         <p:spPr>
           <a:xfrm>
-            <a:off x="15394680" y="29951280"/>
-            <a:ext cx="14505840" cy="5320080"/>
+            <a:off x="15414480" y="20126160"/>
+            <a:ext cx="14504760" cy="7810200"/>
           </a:xfrm>
           <a:prstGeom prst="rect">
             <a:avLst/>
@@ -5815,6 +6039,297 @@
         <p:txBody>
           <a:bodyPr lIns="198000" rIns="198000" tIns="229680" bIns="198000"/>
           <a:p>
+            <a:pPr algn="just">
+              <a:lnSpc>
+                <a:spcPct val="100000"/>
+              </a:lnSpc>
+            </a:pPr>
+            <a:r>
+              <a:rPr b="0" lang="en-US" sz="4000" spc="-1" strike="noStrike">
+                <a:solidFill>
+                  <a:srgbClr val="000000"/>
+                </a:solidFill>
+                <a:uFill>
+                  <a:solidFill>
+                    <a:srgbClr val="ffffff"/>
+                  </a:solidFill>
+                </a:uFill>
+                <a:latin typeface="Arial"/>
+                <a:ea typeface="Arial"/>
+              </a:rPr>
+              <a:t>* Design decisions:</a:t>
+            </a:r>
+            <a:endParaRPr b="0" lang="en-US" sz="1800" spc="-1" strike="noStrike">
+              <a:solidFill>
+                <a:srgbClr val="000000"/>
+              </a:solidFill>
+              <a:uFill>
+                <a:solidFill>
+                  <a:srgbClr val="ffffff"/>
+                </a:solidFill>
+              </a:uFill>
+              <a:latin typeface="Arial"/>
+            </a:endParaRPr>
+          </a:p>
+          <a:p>
+            <a:pPr algn="just">
+              <a:lnSpc>
+                <a:spcPct val="100000"/>
+              </a:lnSpc>
+            </a:pPr>
+            <a:r>
+              <a:rPr b="0" lang="en-US" sz="4000" spc="-1" strike="noStrike">
+                <a:solidFill>
+                  <a:srgbClr val="000000"/>
+                </a:solidFill>
+                <a:uFill>
+                  <a:solidFill>
+                    <a:srgbClr val="ffffff"/>
+                  </a:solidFill>
+                </a:uFill>
+                <a:latin typeface="Arial"/>
+                <a:ea typeface="Arial"/>
+              </a:rPr>
+              <a:t>	</a:t>
+            </a:r>
+            <a:r>
+              <a:rPr b="0" lang="en-US" sz="4000" spc="-1" strike="noStrike">
+                <a:solidFill>
+                  <a:srgbClr val="000000"/>
+                </a:solidFill>
+                <a:uFill>
+                  <a:solidFill>
+                    <a:srgbClr val="ffffff"/>
+                  </a:solidFill>
+                </a:uFill>
+                <a:latin typeface="Arial"/>
+                <a:ea typeface="Arial"/>
+              </a:rPr>
+              <a:t>- json file on the top of backend image format [is not specified – but nifti recommended]</a:t>
+            </a:r>
+            <a:endParaRPr b="0" lang="en-US" sz="1800" spc="-1" strike="noStrike">
+              <a:solidFill>
+                <a:srgbClr val="000000"/>
+              </a:solidFill>
+              <a:uFill>
+                <a:solidFill>
+                  <a:srgbClr val="ffffff"/>
+                </a:solidFill>
+              </a:uFill>
+              <a:latin typeface="Arial"/>
+            </a:endParaRPr>
+          </a:p>
+          <a:p>
+            <a:pPr algn="just">
+              <a:lnSpc>
+                <a:spcPct val="100000"/>
+              </a:lnSpc>
+            </a:pPr>
+            <a:r>
+              <a:rPr b="0" lang="en-US" sz="4000" spc="-1" strike="noStrike">
+                <a:solidFill>
+                  <a:srgbClr val="000000"/>
+                </a:solidFill>
+                <a:uFill>
+                  <a:solidFill>
+                    <a:srgbClr val="ffffff"/>
+                  </a:solidFill>
+                </a:uFill>
+                <a:latin typeface="Arial"/>
+                <a:ea typeface="Arial"/>
+              </a:rPr>
+              <a:t>	</a:t>
+            </a:r>
+            <a:r>
+              <a:rPr b="0" lang="en-US" sz="4000" spc="-1" strike="noStrike">
+                <a:solidFill>
+                  <a:srgbClr val="000000"/>
+                </a:solidFill>
+                <a:uFill>
+                  <a:solidFill>
+                    <a:srgbClr val="ffffff"/>
+                  </a:solidFill>
+                </a:uFill>
+                <a:latin typeface="Arial"/>
+                <a:ea typeface="Arial"/>
+              </a:rPr>
+              <a:t>- tags rather than hierachical structure</a:t>
+            </a:r>
+            <a:endParaRPr b="0" lang="en-US" sz="1800" spc="-1" strike="noStrike">
+              <a:solidFill>
+                <a:srgbClr val="000000"/>
+              </a:solidFill>
+              <a:uFill>
+                <a:solidFill>
+                  <a:srgbClr val="ffffff"/>
+                </a:solidFill>
+              </a:uFill>
+              <a:latin typeface="Arial"/>
+            </a:endParaRPr>
+          </a:p>
+          <a:p>
+            <a:pPr algn="just">
+              <a:lnSpc>
+                <a:spcPct val="100000"/>
+              </a:lnSpc>
+            </a:pPr>
+            <a:r>
+              <a:rPr b="0" lang="en-US" sz="4000" spc="-1" strike="noStrike">
+                <a:solidFill>
+                  <a:srgbClr val="000000"/>
+                </a:solidFill>
+                <a:uFill>
+                  <a:solidFill>
+                    <a:srgbClr val="ffffff"/>
+                  </a:solidFill>
+                </a:uFill>
+                <a:latin typeface="Arial"/>
+                <a:ea typeface="Arial"/>
+              </a:rPr>
+              <a:t>	</a:t>
+            </a:r>
+            <a:r>
+              <a:rPr b="0" lang="en-US" sz="4000" spc="-1" strike="noStrike">
+                <a:solidFill>
+                  <a:srgbClr val="000000"/>
+                </a:solidFill>
+                <a:uFill>
+                  <a:solidFill>
+                    <a:srgbClr val="ffffff"/>
+                  </a:solidFill>
+                </a:uFill>
+                <a:latin typeface="Arial"/>
+                <a:ea typeface="Arial"/>
+              </a:rPr>
+              <a:t>- extensible</a:t>
+            </a:r>
+            <a:endParaRPr b="0" lang="en-US" sz="1800" spc="-1" strike="noStrike">
+              <a:solidFill>
+                <a:srgbClr val="000000"/>
+              </a:solidFill>
+              <a:uFill>
+                <a:solidFill>
+                  <a:srgbClr val="ffffff"/>
+                </a:solidFill>
+              </a:uFill>
+              <a:latin typeface="Arial"/>
+            </a:endParaRPr>
+          </a:p>
+          <a:p>
+            <a:pPr algn="just">
+              <a:lnSpc>
+                <a:spcPct val="100000"/>
+              </a:lnSpc>
+            </a:pPr>
+            <a:r>
+              <a:rPr b="0" lang="en-US" sz="4000" spc="-1" strike="noStrike">
+                <a:solidFill>
+                  <a:srgbClr val="000000"/>
+                </a:solidFill>
+                <a:uFill>
+                  <a:solidFill>
+                    <a:srgbClr val="ffffff"/>
+                  </a:solidFill>
+                </a:uFill>
+                <a:latin typeface="Arial"/>
+                <a:ea typeface="Arial"/>
+              </a:rPr>
+              <a:t>* A first specification : </a:t>
+            </a:r>
+            <a:r>
+              <a:rPr b="1" lang="en-US" sz="3600" spc="-1" strike="noStrike">
+                <a:solidFill>
+                  <a:srgbClr val="0000cc"/>
+                </a:solidFill>
+                <a:uFill>
+                  <a:solidFill>
+                    <a:srgbClr val="ffffff"/>
+                  </a:solidFill>
+                </a:uFill>
+                <a:latin typeface="Arial"/>
+                <a:ea typeface="Arial"/>
+              </a:rPr>
+              <a:t>github.com/INCF/HAWG-examples</a:t>
+            </a:r>
+            <a:endParaRPr b="0" lang="en-US" sz="1800" spc="-1" strike="noStrike">
+              <a:solidFill>
+                <a:srgbClr val="000000"/>
+              </a:solidFill>
+              <a:uFill>
+                <a:solidFill>
+                  <a:srgbClr val="ffffff"/>
+                </a:solidFill>
+              </a:uFill>
+              <a:latin typeface="Arial"/>
+            </a:endParaRPr>
+          </a:p>
+          <a:p>
+            <a:pPr algn="just">
+              <a:lnSpc>
+                <a:spcPct val="100000"/>
+              </a:lnSpc>
+            </a:pPr>
+            <a:r>
+              <a:rPr b="0" lang="en-US" sz="4000" spc="-1" strike="noStrike">
+                <a:solidFill>
+                  <a:srgbClr val="000000"/>
+                </a:solidFill>
+                <a:uFill>
+                  <a:solidFill>
+                    <a:srgbClr val="ffffff"/>
+                  </a:solidFill>
+                </a:uFill>
+                <a:latin typeface="Arial"/>
+                <a:ea typeface="Arial"/>
+              </a:rPr>
+              <a:t>* Five examples of implementation of the standard: Freesurfer, AAL, HO, Mouse and Mouse-development atlases, Neuromorphics.  </a:t>
+            </a:r>
+            <a:endParaRPr b="0" lang="en-US" sz="1800" spc="-1" strike="noStrike">
+              <a:solidFill>
+                <a:srgbClr val="000000"/>
+              </a:solidFill>
+              <a:uFill>
+                <a:solidFill>
+                  <a:srgbClr val="ffffff"/>
+                </a:solidFill>
+              </a:uFill>
+              <a:latin typeface="Arial"/>
+            </a:endParaRPr>
+          </a:p>
+          <a:p>
+            <a:pPr algn="just">
+              <a:lnSpc>
+                <a:spcPct val="100000"/>
+              </a:lnSpc>
+            </a:pPr>
+            <a:r>
+              <a:rPr b="0" lang="en-US" sz="4000" spc="-1" strike="noStrike">
+                <a:solidFill>
+                  <a:srgbClr val="000000"/>
+                </a:solidFill>
+                <a:uFill>
+                  <a:solidFill>
+                    <a:srgbClr val="ffffff"/>
+                  </a:solidFill>
+                </a:uFill>
+                <a:latin typeface="Arial"/>
+                <a:ea typeface="Arial"/>
+              </a:rPr>
+              <a:t>* Github repository for issues, proposals, branches and implementation</a:t>
+            </a:r>
+            <a:endParaRPr b="0" lang="en-US" sz="1800" spc="-1" strike="noStrike">
+              <a:solidFill>
+                <a:srgbClr val="000000"/>
+              </a:solidFill>
+              <a:uFill>
+                <a:solidFill>
+                  <a:srgbClr val="ffffff"/>
+                </a:solidFill>
+              </a:uFill>
+              <a:latin typeface="Arial"/>
+            </a:endParaRPr>
+          </a:p>
+          <a:p>
             <a:pPr>
               <a:lnSpc>
                 <a:spcPct val="100000"/>
@@ -5833,7 +6348,22 @@
                 <a:latin typeface="Arial"/>
                 <a:ea typeface="Arial"/>
               </a:rPr>
-              <a:t> </a:t>
+              <a:t>* First validation tools </a:t>
+            </a:r>
+            <a:r>
+              <a:rPr b="1" lang="en-US" sz="3600" spc="-1" strike="noStrike">
+                <a:solidFill>
+                  <a:srgbClr val="3333ff"/>
+                </a:solidFill>
+                <a:uFill>
+                  <a:solidFill>
+                    <a:srgbClr val="ffffff"/>
+                  </a:solidFill>
+                </a:uFill>
+                <a:latin typeface="Arial"/>
+                <a:ea typeface="Arial"/>
+              </a:rPr>
+              <a:t>github.com/stity/atlas-schema</a:t>
             </a:r>
             <a:endParaRPr b="0" lang="en-US" sz="1800" spc="-1" strike="noStrike">
               <a:solidFill>
@@ -5849,16 +6379,220 @@
           </a:p>
         </p:txBody>
       </p:sp>
+      <p:pic>
+        <p:nvPicPr>
+          <p:cNvPr id="64" name="Shape 85" descr=""/>
+          <p:cNvPicPr/>
+          <p:nvPr/>
+        </p:nvPicPr>
+        <p:blipFill>
+          <a:blip r:embed="rId2"/>
+          <a:stretch/>
+        </p:blipFill>
+        <p:spPr>
+          <a:xfrm>
+            <a:off x="21211200" y="14790600"/>
+            <a:ext cx="8686440" cy="4344840"/>
+          </a:xfrm>
+          <a:prstGeom prst="rect">
+            <a:avLst/>
+          </a:prstGeom>
+          <a:ln w="36720">
+            <a:solidFill>
+              <a:srgbClr val="3465a4"/>
+            </a:solidFill>
+            <a:round/>
+          </a:ln>
+        </p:spPr>
+      </p:pic>
+      <p:pic>
+        <p:nvPicPr>
+          <p:cNvPr id="65" name="Shape 88" descr=""/>
+          <p:cNvPicPr/>
+          <p:nvPr/>
+        </p:nvPicPr>
+        <p:blipFill>
+          <a:blip r:embed="rId3"/>
+          <a:stretch/>
+        </p:blipFill>
+        <p:spPr>
+          <a:xfrm>
+            <a:off x="15470640" y="28747080"/>
+            <a:ext cx="5103000" cy="6595200"/>
+          </a:xfrm>
+          <a:prstGeom prst="rect">
+            <a:avLst/>
+          </a:prstGeom>
+          <a:ln w="36720">
+            <a:solidFill>
+              <a:srgbClr val="3465a4"/>
+            </a:solidFill>
+            <a:round/>
+          </a:ln>
+        </p:spPr>
+      </p:pic>
+      <p:pic>
+        <p:nvPicPr>
+          <p:cNvPr id="66" name="Shape 87" descr=""/>
+          <p:cNvPicPr/>
+          <p:nvPr/>
+        </p:nvPicPr>
+        <p:blipFill>
+          <a:blip r:embed="rId4"/>
+          <a:stretch/>
+        </p:blipFill>
+        <p:spPr>
+          <a:xfrm>
+            <a:off x="18562320" y="28299600"/>
+            <a:ext cx="6583320" cy="7044480"/>
+          </a:xfrm>
+          <a:prstGeom prst="rect">
+            <a:avLst/>
+          </a:prstGeom>
+          <a:ln w="36720">
+            <a:solidFill>
+              <a:srgbClr val="3465a4"/>
+            </a:solidFill>
+            <a:round/>
+          </a:ln>
+        </p:spPr>
+      </p:pic>
+      <p:pic>
+        <p:nvPicPr>
+          <p:cNvPr id="67" name="Shape 86" descr=""/>
+          <p:cNvPicPr/>
+          <p:nvPr/>
+        </p:nvPicPr>
+        <p:blipFill>
+          <a:blip r:embed="rId5"/>
+          <a:stretch/>
+        </p:blipFill>
+        <p:spPr>
+          <a:xfrm>
+            <a:off x="22558320" y="27936720"/>
+            <a:ext cx="7340400" cy="7458840"/>
+          </a:xfrm>
+          <a:prstGeom prst="rect">
+            <a:avLst/>
+          </a:prstGeom>
+          <a:ln w="36720">
+            <a:solidFill>
+              <a:srgbClr val="3465a4"/>
+            </a:solidFill>
+            <a:round/>
+          </a:ln>
+        </p:spPr>
+      </p:pic>
       <p:sp>
         <p:nvSpPr>
-          <p:cNvPr id="65" name="CustomShape 19"/>
+          <p:cNvPr id="68" name="CustomShape 18"/>
           <p:cNvSpPr/>
           <p:nvPr/>
         </p:nvSpPr>
         <p:spPr>
           <a:xfrm>
-            <a:off x="15414480" y="21998160"/>
-            <a:ext cx="14505840" cy="7811280"/>
+            <a:off x="18818280" y="6740640"/>
+            <a:ext cx="11066040" cy="2584080"/>
+          </a:xfrm>
+          <a:prstGeom prst="rect">
+            <a:avLst/>
+          </a:prstGeom>
+          <a:noFill/>
+          <a:ln>
+            <a:noFill/>
+          </a:ln>
+        </p:spPr>
+        <p:style>
+          <a:lnRef idx="0"/>
+          <a:fillRef idx="0"/>
+          <a:effectRef idx="0"/>
+          <a:fontRef idx="minor"/>
+        </p:style>
+        <p:txBody>
+          <a:bodyPr lIns="90000" rIns="90000" tIns="91440" bIns="91440" anchor="ctr"/>
+          <a:p>
+            <a:pPr>
+              <a:lnSpc>
+                <a:spcPct val="100000"/>
+              </a:lnSpc>
+            </a:pPr>
+            <a:r>
+              <a:rPr b="0" lang="en-US" sz="2800" spc="-1" strike="noStrike" u="sng">
+                <a:solidFill>
+                  <a:srgbClr val="000000"/>
+                </a:solidFill>
+                <a:uFill>
+                  <a:solidFill>
+                    <a:srgbClr val="ffffff"/>
+                  </a:solidFill>
+                </a:uFill>
+                <a:latin typeface="Arial"/>
+                <a:ea typeface="Arial"/>
+              </a:rPr>
+              <a:t>Acknowledgments:</a:t>
+            </a:r>
+            <a:r>
+              <a:rPr b="0" lang="en-US" sz="2800" spc="-1" strike="noStrike">
+                <a:solidFill>
+                  <a:srgbClr val="000000"/>
+                </a:solidFill>
+                <a:uFill>
+                  <a:solidFill>
+                    <a:srgbClr val="ffffff"/>
+                  </a:solidFill>
+                </a:uFill>
+                <a:latin typeface="Arial"/>
+                <a:ea typeface="Arial"/>
+              </a:rPr>
+              <a:t> We would like to acknowledge the work of all the INCF Neuroimaging Data Sharing (NIDASH) task force members as well as of many other colleagues who have helped the task force projects. We are particularly indebted to Mathew Abrams, Linda Lanyon and all the INCF staff for their efficient support.   </a:t>
+            </a:r>
+            <a:endParaRPr b="0" lang="en-US" sz="1800" spc="-1" strike="noStrike">
+              <a:solidFill>
+                <a:srgbClr val="000000"/>
+              </a:solidFill>
+              <a:uFill>
+                <a:solidFill>
+                  <a:srgbClr val="ffffff"/>
+                </a:solidFill>
+              </a:uFill>
+              <a:latin typeface="Arial"/>
+            </a:endParaRPr>
+          </a:p>
+        </p:txBody>
+      </p:sp>
+      <p:pic>
+        <p:nvPicPr>
+          <p:cNvPr id="69" name="" descr=""/>
+          <p:cNvPicPr/>
+          <p:nvPr/>
+        </p:nvPicPr>
+        <p:blipFill>
+          <a:blip r:embed="rId6"/>
+          <a:stretch/>
+        </p:blipFill>
+        <p:spPr>
+          <a:xfrm>
+            <a:off x="6400800" y="18682920"/>
+            <a:ext cx="8650440" cy="6536160"/>
+          </a:xfrm>
+          <a:prstGeom prst="rect">
+            <a:avLst/>
+          </a:prstGeom>
+          <a:ln>
+            <a:noFill/>
+          </a:ln>
+        </p:spPr>
+      </p:pic>
+      <p:sp>
+        <p:nvSpPr>
+          <p:cNvPr id="70" name="CustomShape 19"/>
+          <p:cNvSpPr/>
+          <p:nvPr/>
+        </p:nvSpPr>
+        <p:spPr>
+          <a:xfrm>
+            <a:off x="258480" y="18689760"/>
+            <a:ext cx="6217560" cy="6493320"/>
           </a:xfrm>
           <a:prstGeom prst="rect">
             <a:avLst/>
@@ -5882,7 +6616,7 @@
         <p:txBody>
           <a:bodyPr lIns="198000" rIns="198000" tIns="229680" bIns="198000"/>
           <a:p>
-            <a:pPr algn="just">
+            <a:pPr algn="ctr">
               <a:lnSpc>
                 <a:spcPct val="100000"/>
               </a:lnSpc>
@@ -5900,22 +6634,22 @@
                 <a:latin typeface="Arial"/>
                 <a:ea typeface="Arial"/>
               </a:rPr>
-              <a:t>* Design decisions:</a:t>
-            </a:r>
-            <a:endParaRPr b="0" lang="en-US" sz="1800" spc="-1" strike="noStrike">
-              <a:solidFill>
-                <a:srgbClr val="000000"/>
-              </a:solidFill>
-              <a:uFill>
-                <a:solidFill>
-                  <a:srgbClr val="ffffff"/>
-                </a:solidFill>
-              </a:uFill>
-              <a:latin typeface="Arial"/>
-            </a:endParaRPr>
-          </a:p>
-          <a:p>
-            <a:pPr algn="just">
+              <a:t>Conclusion:</a:t>
+            </a:r>
+            <a:endParaRPr b="0" lang="en-US" sz="1800" spc="-1" strike="noStrike">
+              <a:solidFill>
+                <a:srgbClr val="000000"/>
+              </a:solidFill>
+              <a:uFill>
+                <a:solidFill>
+                  <a:srgbClr val="ffffff"/>
+                </a:solidFill>
+              </a:uFill>
+              <a:latin typeface="Arial"/>
+            </a:endParaRPr>
+          </a:p>
+          <a:p>
+            <a:pPr algn="ctr">
               <a:lnSpc>
                 <a:spcPct val="100000"/>
               </a:lnSpc>
@@ -5933,7 +6667,22 @@
                 <a:latin typeface="Arial"/>
                 <a:ea typeface="Arial"/>
               </a:rPr>
-              <a:t>	</a:t>
+              <a:t>To be </a:t>
+            </a:r>
+            <a:r>
+              <a:rPr b="1" lang="en-US" sz="4000" spc="-1" strike="noStrike">
+                <a:solidFill>
+                  <a:srgbClr val="000000"/>
+                </a:solidFill>
+                <a:uFill>
+                  <a:solidFill>
+                    <a:srgbClr val="ffffff"/>
+                  </a:solidFill>
+                </a:uFill>
+                <a:latin typeface="Arial"/>
+                <a:ea typeface="Arial"/>
+              </a:rPr>
+              <a:t>efficient, avoid errors, and facilitate conceptualization</a:t>
             </a:r>
             <a:r>
               <a:rPr b="0" lang="en-US" sz="4000" spc="-1" strike="noStrike">
@@ -5948,260 +6697,7 @@
                 <a:latin typeface="Arial"/>
                 <a:ea typeface="Arial"/>
               </a:rPr>
-              <a:t>- json file on the top of backend image format [is not specified – but nifti recommended]</a:t>
-            </a:r>
-            <a:endParaRPr b="0" lang="en-US" sz="1800" spc="-1" strike="noStrike">
-              <a:solidFill>
-                <a:srgbClr val="000000"/>
-              </a:solidFill>
-              <a:uFill>
-                <a:solidFill>
-                  <a:srgbClr val="ffffff"/>
-                </a:solidFill>
-              </a:uFill>
-              <a:latin typeface="Arial"/>
-            </a:endParaRPr>
-          </a:p>
-          <a:p>
-            <a:pPr algn="just">
-              <a:lnSpc>
-                <a:spcPct val="100000"/>
-              </a:lnSpc>
-            </a:pPr>
-            <a:r>
-              <a:rPr b="0" lang="en-US" sz="4000" spc="-1" strike="noStrike">
-                <a:solidFill>
-                  <a:srgbClr val="000000"/>
-                </a:solidFill>
-                <a:uFill>
-                  <a:solidFill>
-                    <a:srgbClr val="ffffff"/>
-                  </a:solidFill>
-                </a:uFill>
-                <a:latin typeface="Arial"/>
-                <a:ea typeface="Arial"/>
-              </a:rPr>
-              <a:t>	</a:t>
-            </a:r>
-            <a:r>
-              <a:rPr b="0" lang="en-US" sz="4000" spc="-1" strike="noStrike">
-                <a:solidFill>
-                  <a:srgbClr val="000000"/>
-                </a:solidFill>
-                <a:uFill>
-                  <a:solidFill>
-                    <a:srgbClr val="ffffff"/>
-                  </a:solidFill>
-                </a:uFill>
-                <a:latin typeface="Arial"/>
-                <a:ea typeface="Arial"/>
-              </a:rPr>
-              <a:t>- tags rather than hierachical structure</a:t>
-            </a:r>
-            <a:endParaRPr b="0" lang="en-US" sz="1800" spc="-1" strike="noStrike">
-              <a:solidFill>
-                <a:srgbClr val="000000"/>
-              </a:solidFill>
-              <a:uFill>
-                <a:solidFill>
-                  <a:srgbClr val="ffffff"/>
-                </a:solidFill>
-              </a:uFill>
-              <a:latin typeface="Arial"/>
-            </a:endParaRPr>
-          </a:p>
-          <a:p>
-            <a:pPr algn="just">
-              <a:lnSpc>
-                <a:spcPct val="100000"/>
-              </a:lnSpc>
-            </a:pPr>
-            <a:r>
-              <a:rPr b="0" lang="en-US" sz="4000" spc="-1" strike="noStrike">
-                <a:solidFill>
-                  <a:srgbClr val="000000"/>
-                </a:solidFill>
-                <a:uFill>
-                  <a:solidFill>
-                    <a:srgbClr val="ffffff"/>
-                  </a:solidFill>
-                </a:uFill>
-                <a:latin typeface="Arial"/>
-                <a:ea typeface="Arial"/>
-              </a:rPr>
-              <a:t>	</a:t>
-            </a:r>
-            <a:r>
-              <a:rPr b="0" lang="en-US" sz="4000" spc="-1" strike="noStrike">
-                <a:solidFill>
-                  <a:srgbClr val="000000"/>
-                </a:solidFill>
-                <a:uFill>
-                  <a:solidFill>
-                    <a:srgbClr val="ffffff"/>
-                  </a:solidFill>
-                </a:uFill>
-                <a:latin typeface="Arial"/>
-                <a:ea typeface="Arial"/>
-              </a:rPr>
-              <a:t>- extensible</a:t>
-            </a:r>
-            <a:endParaRPr b="0" lang="en-US" sz="1800" spc="-1" strike="noStrike">
-              <a:solidFill>
-                <a:srgbClr val="000000"/>
-              </a:solidFill>
-              <a:uFill>
-                <a:solidFill>
-                  <a:srgbClr val="ffffff"/>
-                </a:solidFill>
-              </a:uFill>
-              <a:latin typeface="Arial"/>
-            </a:endParaRPr>
-          </a:p>
-          <a:p>
-            <a:pPr algn="just">
-              <a:lnSpc>
-                <a:spcPct val="100000"/>
-              </a:lnSpc>
-            </a:pPr>
-            <a:r>
-              <a:rPr b="0" lang="en-US" sz="4000" spc="-1" strike="noStrike">
-                <a:solidFill>
-                  <a:srgbClr val="000000"/>
-                </a:solidFill>
-                <a:uFill>
-                  <a:solidFill>
-                    <a:srgbClr val="ffffff"/>
-                  </a:solidFill>
-                </a:uFill>
-                <a:latin typeface="Arial"/>
-                <a:ea typeface="Arial"/>
-              </a:rPr>
-              <a:t>* A first specification : </a:t>
-            </a:r>
-            <a:r>
-              <a:rPr b="1" lang="en-US" sz="4000" spc="-1" strike="noStrike">
-                <a:solidFill>
-                  <a:srgbClr val="ff9900"/>
-                </a:solidFill>
-                <a:uFill>
-                  <a:solidFill>
-                    <a:srgbClr val="ffffff"/>
-                  </a:solidFill>
-                </a:uFill>
-                <a:latin typeface="Arial"/>
-                <a:ea typeface="Arial"/>
-              </a:rPr>
-              <a:t>github.com/INCF/HAWG-examples</a:t>
-            </a:r>
-            <a:endParaRPr b="0" lang="en-US" sz="1800" spc="-1" strike="noStrike">
-              <a:solidFill>
-                <a:srgbClr val="000000"/>
-              </a:solidFill>
-              <a:uFill>
-                <a:solidFill>
-                  <a:srgbClr val="ffffff"/>
-                </a:solidFill>
-              </a:uFill>
-              <a:latin typeface="Arial"/>
-            </a:endParaRPr>
-          </a:p>
-          <a:p>
-            <a:pPr algn="just">
-              <a:lnSpc>
-                <a:spcPct val="100000"/>
-              </a:lnSpc>
-            </a:pPr>
-            <a:r>
-              <a:rPr b="0" lang="en-US" sz="4000" spc="-1" strike="noStrike">
-                <a:solidFill>
-                  <a:srgbClr val="000000"/>
-                </a:solidFill>
-                <a:uFill>
-                  <a:solidFill>
-                    <a:srgbClr val="ffffff"/>
-                  </a:solidFill>
-                </a:uFill>
-                <a:latin typeface="Arial"/>
-                <a:ea typeface="Arial"/>
-              </a:rPr>
-              <a:t>* Five examples of implementation of the standard: Freesurfer, AAL, HO, Mouse and Mouse-development atlases, Neuromorphics.  </a:t>
-            </a:r>
-            <a:endParaRPr b="0" lang="en-US" sz="1800" spc="-1" strike="noStrike">
-              <a:solidFill>
-                <a:srgbClr val="000000"/>
-              </a:solidFill>
-              <a:uFill>
-                <a:solidFill>
-                  <a:srgbClr val="ffffff"/>
-                </a:solidFill>
-              </a:uFill>
-              <a:latin typeface="Arial"/>
-            </a:endParaRPr>
-          </a:p>
-          <a:p>
-            <a:pPr algn="just">
-              <a:lnSpc>
-                <a:spcPct val="100000"/>
-              </a:lnSpc>
-            </a:pPr>
-            <a:r>
-              <a:rPr b="0" lang="en-US" sz="4000" spc="-1" strike="noStrike">
-                <a:solidFill>
-                  <a:srgbClr val="000000"/>
-                </a:solidFill>
-                <a:uFill>
-                  <a:solidFill>
-                    <a:srgbClr val="ffffff"/>
-                  </a:solidFill>
-                </a:uFill>
-                <a:latin typeface="Arial"/>
-                <a:ea typeface="DejaVu Sans"/>
-              </a:rPr>
-              <a:t>* Github repository for issues, proposals, branches and implementation</a:t>
-            </a:r>
-            <a:endParaRPr b="0" lang="en-US" sz="1800" spc="-1" strike="noStrike">
-              <a:solidFill>
-                <a:srgbClr val="000000"/>
-              </a:solidFill>
-              <a:uFill>
-                <a:solidFill>
-                  <a:srgbClr val="ffffff"/>
-                </a:solidFill>
-              </a:uFill>
-              <a:latin typeface="Arial"/>
-            </a:endParaRPr>
-          </a:p>
-          <a:p>
-            <a:r>
-              <a:rPr b="0" lang="en-US" sz="4000" spc="-1" strike="noStrike">
-                <a:solidFill>
-                  <a:srgbClr val="000000"/>
-                </a:solidFill>
-                <a:uFill>
-                  <a:solidFill>
-                    <a:srgbClr val="ffffff"/>
-                  </a:solidFill>
-                </a:uFill>
-                <a:latin typeface="Arial"/>
-                <a:ea typeface="DejaVu Sans"/>
-              </a:rPr>
-              <a:t>* First validation tools </a:t>
-            </a:r>
-            <a:r>
-              <a:rPr b="0" lang="en-US" sz="4000" spc="-1" strike="noStrike">
-                <a:solidFill>
-                  <a:srgbClr val="000000"/>
-                </a:solidFill>
-                <a:uFill>
-                  <a:solidFill>
-                    <a:srgbClr val="ffffff"/>
-                  </a:solidFill>
-                </a:uFill>
-                <a:latin typeface="Arial"/>
-                <a:ea typeface="DejaVu Sans"/>
-              </a:rPr>
-              <a:t>https://github.com/stity/atlas-schema</a:t>
+              <a:t> of the field, we need a common format and some reference implementation for common software. </a:t>
             </a:r>
             <a:endParaRPr b="0" lang="en-US" sz="1800" spc="-1" strike="noStrike">
               <a:solidFill>
@@ -6217,110 +6713,1172 @@
           </a:p>
         </p:txBody>
       </p:sp>
-      <p:pic>
-        <p:nvPicPr>
-          <p:cNvPr id="66" name="" descr=""/>
-          <p:cNvPicPr/>
+      <p:sp>
+        <p:nvSpPr>
+          <p:cNvPr id="71" name="CustomShape 20"/>
+          <p:cNvSpPr/>
           <p:nvPr/>
-        </p:nvPicPr>
-        <p:blipFill>
-          <a:blip r:embed="rId2"/>
-          <a:stretch/>
-        </p:blipFill>
-        <p:spPr>
-          <a:xfrm>
-            <a:off x="19698480" y="15819840"/>
-            <a:ext cx="10177920" cy="5091840"/>
-          </a:xfrm>
-          <a:prstGeom prst="rect">
-            <a:avLst/>
-          </a:prstGeom>
-          <a:ln w="36720">
-            <a:solidFill>
-              <a:srgbClr val="3465a4"/>
-            </a:solidFill>
-            <a:round/>
+        </p:nvSpPr>
+        <p:spPr>
+          <a:xfrm>
+            <a:off x="10257840" y="22513680"/>
+            <a:ext cx="1005480" cy="437400"/>
+          </a:xfrm>
+          <a:prstGeom prst="rect">
+            <a:avLst/>
+          </a:prstGeom>
+          <a:solidFill>
+            <a:srgbClr val="ffffff"/>
+          </a:solidFill>
+          <a:ln>
+            <a:noFill/>
           </a:ln>
         </p:spPr>
-      </p:pic>
-      <p:pic>
-        <p:nvPicPr>
-          <p:cNvPr id="67" name="" descr=""/>
-          <p:cNvPicPr/>
+        <p:style>
+          <a:lnRef idx="0"/>
+          <a:fillRef idx="0"/>
+          <a:effectRef idx="0"/>
+          <a:fontRef idx="minor"/>
+        </p:style>
+        <p:txBody>
+          <a:bodyPr lIns="90000" rIns="90000" tIns="45000" bIns="45000"/>
+          <a:p>
+            <a:pPr algn="ctr">
+              <a:lnSpc>
+                <a:spcPct val="100000"/>
+              </a:lnSpc>
+            </a:pPr>
+            <a:r>
+              <a:rPr b="0" lang="en-US" sz="1800" spc="-1" strike="noStrike">
+                <a:solidFill>
+                  <a:srgbClr val="000000"/>
+                </a:solidFill>
+                <a:uFill>
+                  <a:solidFill>
+                    <a:srgbClr val="ffffff"/>
+                  </a:solidFill>
+                </a:uFill>
+                <a:latin typeface="Arial"/>
+              </a:rPr>
+              <a:t>HAWG</a:t>
+            </a:r>
+            <a:endParaRPr b="0" lang="en-US" sz="1800" spc="-1" strike="noStrike">
+              <a:solidFill>
+                <a:srgbClr val="000000"/>
+              </a:solidFill>
+              <a:uFill>
+                <a:solidFill>
+                  <a:srgbClr val="ffffff"/>
+                </a:solidFill>
+              </a:uFill>
+              <a:latin typeface="Arial"/>
+            </a:endParaRPr>
+          </a:p>
+        </p:txBody>
+      </p:sp>
+      <p:sp>
+        <p:nvSpPr>
+          <p:cNvPr id="72" name="CustomShape 21"/>
+          <p:cNvSpPr/>
           <p:nvPr/>
-        </p:nvPicPr>
-        <p:blipFill>
-          <a:blip r:embed="rId3"/>
-          <a:stretch/>
-        </p:blipFill>
-        <p:spPr>
-          <a:xfrm>
-            <a:off x="24730560" y="29879280"/>
-            <a:ext cx="5169960" cy="5253120"/>
-          </a:xfrm>
-          <a:prstGeom prst="rect">
-            <a:avLst/>
-          </a:prstGeom>
-          <a:ln w="36720">
-            <a:solidFill>
-              <a:srgbClr val="3465a4"/>
-            </a:solidFill>
-            <a:round/>
+        </p:nvSpPr>
+        <p:spPr>
+          <a:xfrm>
+            <a:off x="7989840" y="18769680"/>
+            <a:ext cx="826920" cy="345960"/>
+          </a:xfrm>
+          <a:prstGeom prst="rect">
+            <a:avLst/>
+          </a:prstGeom>
+          <a:solidFill>
+            <a:srgbClr val="ffffff"/>
+          </a:solidFill>
+          <a:ln>
+            <a:noFill/>
           </a:ln>
         </p:spPr>
-      </p:pic>
-      <p:pic>
-        <p:nvPicPr>
-          <p:cNvPr id="68" name="" descr=""/>
-          <p:cNvPicPr/>
+        <p:style>
+          <a:lnRef idx="0"/>
+          <a:fillRef idx="0"/>
+          <a:effectRef idx="0"/>
+          <a:fontRef idx="minor"/>
+        </p:style>
+        <p:txBody>
+          <a:bodyPr lIns="90000" rIns="90000" tIns="45000" bIns="45000"/>
+          <a:p>
+            <a:pPr algn="ctr">
+              <a:lnSpc>
+                <a:spcPct val="100000"/>
+              </a:lnSpc>
+            </a:pPr>
+            <a:r>
+              <a:rPr b="0" lang="en-US" sz="1800" spc="-1" strike="noStrike">
+                <a:solidFill>
+                  <a:srgbClr val="000000"/>
+                </a:solidFill>
+                <a:uFill>
+                  <a:solidFill>
+                    <a:srgbClr val="ffffff"/>
+                  </a:solidFill>
+                </a:uFill>
+                <a:latin typeface="Arial"/>
+              </a:rPr>
+              <a:t>HO</a:t>
+            </a:r>
+            <a:endParaRPr b="0" lang="en-US" sz="1800" spc="-1" strike="noStrike">
+              <a:solidFill>
+                <a:srgbClr val="000000"/>
+              </a:solidFill>
+              <a:uFill>
+                <a:solidFill>
+                  <a:srgbClr val="ffffff"/>
+                </a:solidFill>
+              </a:uFill>
+              <a:latin typeface="Arial"/>
+            </a:endParaRPr>
+          </a:p>
+        </p:txBody>
+      </p:sp>
+      <p:sp>
+        <p:nvSpPr>
+          <p:cNvPr id="73" name="CustomShape 22"/>
+          <p:cNvSpPr/>
           <p:nvPr/>
-        </p:nvPicPr>
-        <p:blipFill>
-          <a:blip r:embed="rId4"/>
-          <a:stretch/>
-        </p:blipFill>
-        <p:spPr>
-          <a:xfrm>
-            <a:off x="19728360" y="29879280"/>
-            <a:ext cx="5005440" cy="5356080"/>
-          </a:xfrm>
-          <a:prstGeom prst="rect">
-            <a:avLst/>
-          </a:prstGeom>
-          <a:ln w="36720">
-            <a:solidFill>
-              <a:srgbClr val="3465a4"/>
-            </a:solidFill>
-            <a:round/>
+        </p:nvSpPr>
+        <p:spPr>
+          <a:xfrm>
+            <a:off x="7773840" y="19057680"/>
+            <a:ext cx="826920" cy="437400"/>
+          </a:xfrm>
+          <a:prstGeom prst="rect">
+            <a:avLst/>
+          </a:prstGeom>
+          <a:solidFill>
+            <a:srgbClr val="ffffff"/>
+          </a:solidFill>
+          <a:ln>
+            <a:noFill/>
           </a:ln>
         </p:spPr>
-      </p:pic>
-      <p:pic>
-        <p:nvPicPr>
-          <p:cNvPr id="69" name="" descr=""/>
-          <p:cNvPicPr/>
+        <p:style>
+          <a:lnRef idx="0"/>
+          <a:fillRef idx="0"/>
+          <a:effectRef idx="0"/>
+          <a:fontRef idx="minor"/>
+        </p:style>
+        <p:txBody>
+          <a:bodyPr lIns="90000" rIns="90000" tIns="45000" bIns="45000"/>
+          <a:p>
+            <a:pPr algn="ctr">
+              <a:lnSpc>
+                <a:spcPct val="100000"/>
+              </a:lnSpc>
+            </a:pPr>
+            <a:r>
+              <a:rPr b="0" lang="en-US" sz="1800" spc="-1" strike="noStrike">
+                <a:solidFill>
+                  <a:srgbClr val="000000"/>
+                </a:solidFill>
+                <a:uFill>
+                  <a:solidFill>
+                    <a:srgbClr val="ffffff"/>
+                  </a:solidFill>
+                </a:uFill>
+                <a:latin typeface="Arial"/>
+              </a:rPr>
+              <a:t>AAL</a:t>
+            </a:r>
+            <a:endParaRPr b="0" lang="en-US" sz="1800" spc="-1" strike="noStrike">
+              <a:solidFill>
+                <a:srgbClr val="000000"/>
+              </a:solidFill>
+              <a:uFill>
+                <a:solidFill>
+                  <a:srgbClr val="ffffff"/>
+                </a:solidFill>
+              </a:uFill>
+              <a:latin typeface="Arial"/>
+            </a:endParaRPr>
+          </a:p>
+        </p:txBody>
+      </p:sp>
+      <p:sp>
+        <p:nvSpPr>
+          <p:cNvPr id="74" name="CustomShape 23"/>
+          <p:cNvSpPr/>
           <p:nvPr/>
-        </p:nvPicPr>
-        <p:blipFill>
-          <a:blip r:embed="rId5"/>
-          <a:stretch/>
-        </p:blipFill>
-        <p:spPr>
-          <a:xfrm>
-            <a:off x="15470640" y="29884320"/>
-            <a:ext cx="4168440" cy="5387040"/>
-          </a:xfrm>
-          <a:prstGeom prst="rect">
-            <a:avLst/>
-          </a:prstGeom>
-          <a:ln w="36720">
-            <a:solidFill>
-              <a:srgbClr val="3465a4"/>
-            </a:solidFill>
-            <a:round/>
+        </p:nvSpPr>
+        <p:spPr>
+          <a:xfrm>
+            <a:off x="12381840" y="18769680"/>
+            <a:ext cx="1333800" cy="345960"/>
+          </a:xfrm>
+          <a:prstGeom prst="rect">
+            <a:avLst/>
+          </a:prstGeom>
+          <a:solidFill>
+            <a:srgbClr val="ffffff"/>
+          </a:solidFill>
+          <a:ln>
+            <a:noFill/>
           </a:ln>
         </p:spPr>
-      </p:pic>
+        <p:style>
+          <a:lnRef idx="0"/>
+          <a:fillRef idx="0"/>
+          <a:effectRef idx="0"/>
+          <a:fontRef idx="minor"/>
+        </p:style>
+        <p:txBody>
+          <a:bodyPr lIns="90000" rIns="90000" tIns="45000" bIns="45000"/>
+          <a:p>
+            <a:pPr algn="ctr">
+              <a:lnSpc>
+                <a:spcPct val="100000"/>
+              </a:lnSpc>
+            </a:pPr>
+            <a:r>
+              <a:rPr b="0" lang="en-US" sz="1800" spc="-1" strike="noStrike">
+                <a:solidFill>
+                  <a:srgbClr val="000000"/>
+                </a:solidFill>
+                <a:uFill>
+                  <a:solidFill>
+                    <a:srgbClr val="ffffff"/>
+                  </a:solidFill>
+                </a:uFill>
+                <a:latin typeface="Arial"/>
+              </a:rPr>
+              <a:t>FreeSurfer</a:t>
+            </a:r>
+            <a:endParaRPr b="0" lang="en-US" sz="1800" spc="-1" strike="noStrike">
+              <a:solidFill>
+                <a:srgbClr val="000000"/>
+              </a:solidFill>
+              <a:uFill>
+                <a:solidFill>
+                  <a:srgbClr val="ffffff"/>
+                </a:solidFill>
+              </a:uFill>
+              <a:latin typeface="Arial"/>
+            </a:endParaRPr>
+          </a:p>
+        </p:txBody>
+      </p:sp>
+      <p:sp>
+        <p:nvSpPr>
+          <p:cNvPr id="75" name="CustomShape 24"/>
+          <p:cNvSpPr/>
+          <p:nvPr/>
+        </p:nvSpPr>
+        <p:spPr>
+          <a:xfrm>
+            <a:off x="6675120" y="19381680"/>
+            <a:ext cx="1817640" cy="345960"/>
+          </a:xfrm>
+          <a:prstGeom prst="rect">
+            <a:avLst/>
+          </a:prstGeom>
+          <a:solidFill>
+            <a:srgbClr val="ffffff"/>
+          </a:solidFill>
+          <a:ln>
+            <a:noFill/>
+          </a:ln>
+        </p:spPr>
+        <p:style>
+          <a:lnRef idx="0"/>
+          <a:fillRef idx="0"/>
+          <a:effectRef idx="0"/>
+          <a:fontRef idx="minor"/>
+        </p:style>
+        <p:txBody>
+          <a:bodyPr lIns="90000" rIns="90000" tIns="45000" bIns="45000"/>
+          <a:p>
+            <a:pPr algn="ctr">
+              <a:lnSpc>
+                <a:spcPct val="100000"/>
+              </a:lnSpc>
+            </a:pPr>
+            <a:r>
+              <a:rPr b="0" lang="en-US" sz="1800" spc="-1" strike="noStrike">
+                <a:solidFill>
+                  <a:srgbClr val="000000"/>
+                </a:solidFill>
+                <a:uFill>
+                  <a:solidFill>
+                    <a:srgbClr val="ffffff"/>
+                  </a:solidFill>
+                </a:uFill>
+                <a:latin typeface="Arial"/>
+              </a:rPr>
+              <a:t>Neuromorphic</a:t>
+            </a:r>
+            <a:endParaRPr b="0" lang="en-US" sz="1800" spc="-1" strike="noStrike">
+              <a:solidFill>
+                <a:srgbClr val="000000"/>
+              </a:solidFill>
+              <a:uFill>
+                <a:solidFill>
+                  <a:srgbClr val="ffffff"/>
+                </a:solidFill>
+              </a:uFill>
+              <a:latin typeface="Arial"/>
+            </a:endParaRPr>
+          </a:p>
+        </p:txBody>
+      </p:sp>
+      <p:sp>
+        <p:nvSpPr>
+          <p:cNvPr id="76" name="CustomShape 25"/>
+          <p:cNvSpPr/>
+          <p:nvPr/>
+        </p:nvSpPr>
+        <p:spPr>
+          <a:xfrm>
+            <a:off x="7315200" y="19777680"/>
+            <a:ext cx="1069560" cy="345960"/>
+          </a:xfrm>
+          <a:prstGeom prst="rect">
+            <a:avLst/>
+          </a:prstGeom>
+          <a:solidFill>
+            <a:srgbClr val="ffffff"/>
+          </a:solidFill>
+          <a:ln>
+            <a:noFill/>
+          </a:ln>
+        </p:spPr>
+        <p:style>
+          <a:lnRef idx="0"/>
+          <a:fillRef idx="0"/>
+          <a:effectRef idx="0"/>
+          <a:fontRef idx="minor"/>
+        </p:style>
+        <p:txBody>
+          <a:bodyPr lIns="90000" rIns="90000" tIns="45000" bIns="45000"/>
+          <a:p>
+            <a:pPr algn="ctr">
+              <a:lnSpc>
+                <a:spcPct val="100000"/>
+              </a:lnSpc>
+            </a:pPr>
+            <a:r>
+              <a:rPr b="0" lang="en-US" sz="1800" spc="-1" strike="noStrike">
+                <a:solidFill>
+                  <a:srgbClr val="000000"/>
+                </a:solidFill>
+                <a:uFill>
+                  <a:solidFill>
+                    <a:srgbClr val="ffffff"/>
+                  </a:solidFill>
+                </a:uFill>
+                <a:latin typeface="Arial"/>
+              </a:rPr>
+              <a:t>MNI</a:t>
+            </a:r>
+            <a:endParaRPr b="0" lang="en-US" sz="1800" spc="-1" strike="noStrike">
+              <a:solidFill>
+                <a:srgbClr val="000000"/>
+              </a:solidFill>
+              <a:uFill>
+                <a:solidFill>
+                  <a:srgbClr val="ffffff"/>
+                </a:solidFill>
+              </a:uFill>
+              <a:latin typeface="Arial"/>
+            </a:endParaRPr>
+          </a:p>
+        </p:txBody>
+      </p:sp>
+      <p:sp>
+        <p:nvSpPr>
+          <p:cNvPr id="77" name="CustomShape 26"/>
+          <p:cNvSpPr/>
+          <p:nvPr/>
+        </p:nvSpPr>
+        <p:spPr>
+          <a:xfrm>
+            <a:off x="12561840" y="19093680"/>
+            <a:ext cx="1976760" cy="345960"/>
+          </a:xfrm>
+          <a:prstGeom prst="rect">
+            <a:avLst/>
+          </a:prstGeom>
+          <a:solidFill>
+            <a:srgbClr val="ffffff"/>
+          </a:solidFill>
+          <a:ln>
+            <a:noFill/>
+          </a:ln>
+        </p:spPr>
+        <p:style>
+          <a:lnRef idx="0"/>
+          <a:fillRef idx="0"/>
+          <a:effectRef idx="0"/>
+          <a:fontRef idx="minor"/>
+        </p:style>
+        <p:txBody>
+          <a:bodyPr lIns="90000" rIns="90000" tIns="45000" bIns="45000"/>
+          <a:p>
+            <a:pPr algn="ctr">
+              <a:lnSpc>
+                <a:spcPct val="100000"/>
+              </a:lnSpc>
+            </a:pPr>
+            <a:r>
+              <a:rPr b="0" lang="en-US" sz="1800" spc="-1" strike="noStrike">
+                <a:solidFill>
+                  <a:srgbClr val="000000"/>
+                </a:solidFill>
+                <a:uFill>
+                  <a:solidFill>
+                    <a:srgbClr val="ffffff"/>
+                  </a:solidFill>
+                </a:uFill>
+                <a:latin typeface="Arial"/>
+              </a:rPr>
+              <a:t>Allen Brain</a:t>
+            </a:r>
+            <a:endParaRPr b="0" lang="en-US" sz="1800" spc="-1" strike="noStrike">
+              <a:solidFill>
+                <a:srgbClr val="000000"/>
+              </a:solidFill>
+              <a:uFill>
+                <a:solidFill>
+                  <a:srgbClr val="ffffff"/>
+                </a:solidFill>
+              </a:uFill>
+              <a:latin typeface="Arial"/>
+            </a:endParaRPr>
+          </a:p>
+        </p:txBody>
+      </p:sp>
+      <p:sp>
+        <p:nvSpPr>
+          <p:cNvPr id="78" name="CustomShape 27"/>
+          <p:cNvSpPr/>
+          <p:nvPr/>
+        </p:nvSpPr>
+        <p:spPr>
+          <a:xfrm>
+            <a:off x="12705840" y="19417680"/>
+            <a:ext cx="1780200" cy="601920"/>
+          </a:xfrm>
+          <a:prstGeom prst="rect">
+            <a:avLst/>
+          </a:prstGeom>
+          <a:solidFill>
+            <a:srgbClr val="ffffff"/>
+          </a:solidFill>
+          <a:ln>
+            <a:noFill/>
+          </a:ln>
+        </p:spPr>
+        <p:style>
+          <a:lnRef idx="0"/>
+          <a:fillRef idx="0"/>
+          <a:effectRef idx="0"/>
+          <a:fontRef idx="minor"/>
+        </p:style>
+        <p:txBody>
+          <a:bodyPr lIns="90000" rIns="90000" tIns="45000" bIns="45000"/>
+          <a:p>
+            <a:pPr algn="ctr">
+              <a:lnSpc>
+                <a:spcPct val="100000"/>
+              </a:lnSpc>
+            </a:pPr>
+            <a:r>
+              <a:rPr b="0" lang="en-US" sz="1800" spc="-1" strike="noStrike">
+                <a:solidFill>
+                  <a:srgbClr val="000000"/>
+                </a:solidFill>
+                <a:uFill>
+                  <a:solidFill>
+                    <a:srgbClr val="ffffff"/>
+                  </a:solidFill>
+                </a:uFill>
+                <a:latin typeface="Arial"/>
+              </a:rPr>
+              <a:t>Great future atlas</a:t>
+            </a:r>
+            <a:endParaRPr b="0" lang="en-US" sz="1800" spc="-1" strike="noStrike">
+              <a:solidFill>
+                <a:srgbClr val="000000"/>
+              </a:solidFill>
+              <a:uFill>
+                <a:solidFill>
+                  <a:srgbClr val="ffffff"/>
+                </a:solidFill>
+              </a:uFill>
+              <a:latin typeface="Arial"/>
+            </a:endParaRPr>
+          </a:p>
+        </p:txBody>
+      </p:sp>
+      <p:sp>
+        <p:nvSpPr>
+          <p:cNvPr id="79" name="CustomShape 28"/>
+          <p:cNvSpPr/>
+          <p:nvPr/>
+        </p:nvSpPr>
+        <p:spPr>
+          <a:xfrm>
+            <a:off x="7207200" y="20124000"/>
+            <a:ext cx="1069560" cy="467640"/>
+          </a:xfrm>
+          <a:prstGeom prst="rect">
+            <a:avLst/>
+          </a:prstGeom>
+          <a:solidFill>
+            <a:srgbClr val="ffffff"/>
+          </a:solidFill>
+          <a:ln>
+            <a:noFill/>
+          </a:ln>
+        </p:spPr>
+        <p:style>
+          <a:lnRef idx="0"/>
+          <a:fillRef idx="0"/>
+          <a:effectRef idx="0"/>
+          <a:fontRef idx="minor"/>
+        </p:style>
+        <p:txBody>
+          <a:bodyPr lIns="90000" rIns="90000" tIns="45000" bIns="45000"/>
+          <a:p>
+            <a:pPr algn="ctr">
+              <a:lnSpc>
+                <a:spcPct val="100000"/>
+              </a:lnSpc>
+            </a:pPr>
+            <a:r>
+              <a:rPr b="0" lang="en-US" sz="1800" spc="-1" strike="noStrike">
+                <a:solidFill>
+                  <a:srgbClr val="000000"/>
+                </a:solidFill>
+                <a:uFill>
+                  <a:solidFill>
+                    <a:srgbClr val="ffffff"/>
+                  </a:solidFill>
+                </a:uFill>
+                <a:latin typeface="Arial"/>
+              </a:rPr>
+              <a:t>Pediatric</a:t>
+            </a:r>
+            <a:endParaRPr b="0" lang="en-US" sz="1800" spc="-1" strike="noStrike">
+              <a:solidFill>
+                <a:srgbClr val="000000"/>
+              </a:solidFill>
+              <a:uFill>
+                <a:solidFill>
+                  <a:srgbClr val="ffffff"/>
+                </a:solidFill>
+              </a:uFill>
+              <a:latin typeface="Arial"/>
+            </a:endParaRPr>
+          </a:p>
+        </p:txBody>
+      </p:sp>
+      <p:sp>
+        <p:nvSpPr>
+          <p:cNvPr id="80" name="CustomShape 29"/>
+          <p:cNvSpPr/>
+          <p:nvPr/>
+        </p:nvSpPr>
+        <p:spPr>
+          <a:xfrm>
+            <a:off x="7243200" y="20533680"/>
+            <a:ext cx="1069560" cy="857880"/>
+          </a:xfrm>
+          <a:prstGeom prst="rect">
+            <a:avLst/>
+          </a:prstGeom>
+          <a:solidFill>
+            <a:srgbClr val="ffffff"/>
+          </a:solidFill>
+          <a:ln>
+            <a:noFill/>
+          </a:ln>
+        </p:spPr>
+        <p:style>
+          <a:lnRef idx="0"/>
+          <a:fillRef idx="0"/>
+          <a:effectRef idx="0"/>
+          <a:fontRef idx="minor"/>
+        </p:style>
+        <p:txBody>
+          <a:bodyPr lIns="90000" rIns="90000" tIns="45000" bIns="45000"/>
+          <a:p>
+            <a:pPr algn="ctr">
+              <a:lnSpc>
+                <a:spcPct val="100000"/>
+              </a:lnSpc>
+            </a:pPr>
+            <a:r>
+              <a:rPr b="0" lang="en-US" sz="1800" spc="-1" strike="noStrike">
+                <a:solidFill>
+                  <a:srgbClr val="000000"/>
+                </a:solidFill>
+                <a:uFill>
+                  <a:solidFill>
+                    <a:srgbClr val="ffffff"/>
+                  </a:solidFill>
+                </a:uFill>
+                <a:latin typeface="Arial"/>
+              </a:rPr>
+              <a:t>Atlas version 3.14</a:t>
+            </a:r>
+            <a:endParaRPr b="0" lang="en-US" sz="1800" spc="-1" strike="noStrike">
+              <a:solidFill>
+                <a:srgbClr val="000000"/>
+              </a:solidFill>
+              <a:uFill>
+                <a:solidFill>
+                  <a:srgbClr val="ffffff"/>
+                </a:solidFill>
+              </a:uFill>
+              <a:latin typeface="Arial"/>
+            </a:endParaRPr>
+          </a:p>
+        </p:txBody>
+      </p:sp>
+      <p:sp>
+        <p:nvSpPr>
+          <p:cNvPr id="81" name="CustomShape 30"/>
+          <p:cNvSpPr/>
+          <p:nvPr/>
+        </p:nvSpPr>
+        <p:spPr>
+          <a:xfrm>
+            <a:off x="7040880" y="21361680"/>
+            <a:ext cx="1235880" cy="601920"/>
+          </a:xfrm>
+          <a:prstGeom prst="rect">
+            <a:avLst/>
+          </a:prstGeom>
+          <a:solidFill>
+            <a:srgbClr val="ffffff"/>
+          </a:solidFill>
+          <a:ln>
+            <a:noFill/>
+          </a:ln>
+        </p:spPr>
+        <p:style>
+          <a:lnRef idx="0"/>
+          <a:fillRef idx="0"/>
+          <a:effectRef idx="0"/>
+          <a:fontRef idx="minor"/>
+        </p:style>
+        <p:txBody>
+          <a:bodyPr lIns="90000" rIns="90000" tIns="45000" bIns="45000"/>
+          <a:p>
+            <a:pPr algn="ctr">
+              <a:lnSpc>
+                <a:spcPct val="100000"/>
+              </a:lnSpc>
+            </a:pPr>
+            <a:r>
+              <a:rPr b="0" lang="en-US" sz="1800" spc="-1" strike="noStrike">
+                <a:solidFill>
+                  <a:srgbClr val="000000"/>
+                </a:solidFill>
+                <a:uFill>
+                  <a:solidFill>
+                    <a:srgbClr val="ffffff"/>
+                  </a:solidFill>
+                </a:uFill>
+                <a:latin typeface="Arial"/>
+              </a:rPr>
+              <a:t>pygmy marmoset</a:t>
+            </a:r>
+            <a:endParaRPr b="0" lang="en-US" sz="1800" spc="-1" strike="noStrike">
+              <a:solidFill>
+                <a:srgbClr val="000000"/>
+              </a:solidFill>
+              <a:uFill>
+                <a:solidFill>
+                  <a:srgbClr val="ffffff"/>
+                </a:solidFill>
+              </a:uFill>
+              <a:latin typeface="Arial"/>
+            </a:endParaRPr>
+          </a:p>
+        </p:txBody>
+      </p:sp>
+      <p:sp>
+        <p:nvSpPr>
+          <p:cNvPr id="82" name="CustomShape 31"/>
+          <p:cNvSpPr/>
+          <p:nvPr/>
+        </p:nvSpPr>
+        <p:spPr>
+          <a:xfrm>
+            <a:off x="13167360" y="23413680"/>
+            <a:ext cx="1825560" cy="601920"/>
+          </a:xfrm>
+          <a:prstGeom prst="rect">
+            <a:avLst/>
+          </a:prstGeom>
+          <a:solidFill>
+            <a:srgbClr val="ffffff"/>
+          </a:solidFill>
+          <a:ln>
+            <a:noFill/>
+          </a:ln>
+        </p:spPr>
+        <p:style>
+          <a:lnRef idx="0"/>
+          <a:fillRef idx="0"/>
+          <a:effectRef idx="0"/>
+          <a:fontRef idx="minor"/>
+        </p:style>
+        <p:txBody>
+          <a:bodyPr lIns="90000" rIns="90000" tIns="45000" bIns="45000"/>
+          <a:p>
+            <a:pPr algn="ctr">
+              <a:lnSpc>
+                <a:spcPct val="100000"/>
+              </a:lnSpc>
+            </a:pPr>
+            <a:r>
+              <a:rPr b="0" lang="en-US" sz="1800" spc="-1" strike="noStrike">
+                <a:solidFill>
+                  <a:srgbClr val="000000"/>
+                </a:solidFill>
+                <a:uFill>
+                  <a:solidFill>
+                    <a:srgbClr val="ffffff"/>
+                  </a:solidFill>
+                </a:uFill>
+                <a:latin typeface="Arial"/>
+              </a:rPr>
+              <a:t>Simplest Atlas</a:t>
+            </a:r>
+            <a:endParaRPr b="0" lang="en-US" sz="1800" spc="-1" strike="noStrike">
+              <a:solidFill>
+                <a:srgbClr val="000000"/>
+              </a:solidFill>
+              <a:uFill>
+                <a:solidFill>
+                  <a:srgbClr val="ffffff"/>
+                </a:solidFill>
+              </a:uFill>
+              <a:latin typeface="Arial"/>
+            </a:endParaRPr>
+          </a:p>
+          <a:p>
+            <a:pPr algn="ctr">
+              <a:lnSpc>
+                <a:spcPct val="100000"/>
+              </a:lnSpc>
+            </a:pPr>
+            <a:r>
+              <a:rPr b="0" lang="en-US" sz="1800" spc="-1" strike="noStrike">
+                <a:solidFill>
+                  <a:srgbClr val="000000"/>
+                </a:solidFill>
+                <a:uFill>
+                  <a:solidFill>
+                    <a:srgbClr val="ffffff"/>
+                  </a:solidFill>
+                </a:uFill>
+                <a:latin typeface="Arial"/>
+              </a:rPr>
+              <a:t>ever</a:t>
+            </a:r>
+            <a:endParaRPr b="0" lang="en-US" sz="1800" spc="-1" strike="noStrike">
+              <a:solidFill>
+                <a:srgbClr val="000000"/>
+              </a:solidFill>
+              <a:uFill>
+                <a:solidFill>
+                  <a:srgbClr val="ffffff"/>
+                </a:solidFill>
+              </a:uFill>
+              <a:latin typeface="Arial"/>
+            </a:endParaRPr>
+          </a:p>
+        </p:txBody>
+      </p:sp>
+      <p:sp>
+        <p:nvSpPr>
+          <p:cNvPr id="83" name="CustomShape 32"/>
+          <p:cNvSpPr/>
+          <p:nvPr/>
+        </p:nvSpPr>
+        <p:spPr>
+          <a:xfrm>
+            <a:off x="6711120" y="21974040"/>
+            <a:ext cx="1601640" cy="356400"/>
+          </a:xfrm>
+          <a:prstGeom prst="rect">
+            <a:avLst/>
+          </a:prstGeom>
+          <a:solidFill>
+            <a:srgbClr val="ffffff"/>
+          </a:solidFill>
+          <a:ln>
+            <a:noFill/>
+          </a:ln>
+        </p:spPr>
+        <p:style>
+          <a:lnRef idx="0"/>
+          <a:fillRef idx="0"/>
+          <a:effectRef idx="0"/>
+          <a:fontRef idx="minor"/>
+        </p:style>
+        <p:txBody>
+          <a:bodyPr lIns="90000" rIns="90000" tIns="45000" bIns="45000"/>
+          <a:p>
+            <a:pPr algn="ctr">
+              <a:lnSpc>
+                <a:spcPct val="100000"/>
+              </a:lnSpc>
+            </a:pPr>
+            <a:r>
+              <a:rPr b="0" lang="en-US" sz="1800" spc="-1" strike="noStrike">
+                <a:solidFill>
+                  <a:srgbClr val="000000"/>
+                </a:solidFill>
+                <a:uFill>
+                  <a:solidFill>
+                    <a:srgbClr val="ffffff"/>
+                  </a:solidFill>
+                </a:uFill>
+                <a:latin typeface="Arial"/>
+              </a:rPr>
+              <a:t>Neanderthal</a:t>
+            </a:r>
+            <a:endParaRPr b="0" lang="en-US" sz="1800" spc="-1" strike="noStrike">
+              <a:solidFill>
+                <a:srgbClr val="000000"/>
+              </a:solidFill>
+              <a:uFill>
+                <a:solidFill>
+                  <a:srgbClr val="ffffff"/>
+                </a:solidFill>
+              </a:uFill>
+              <a:latin typeface="Arial"/>
+            </a:endParaRPr>
+          </a:p>
+        </p:txBody>
+      </p:sp>
+      <p:sp>
+        <p:nvSpPr>
+          <p:cNvPr id="84" name="CustomShape 33"/>
+          <p:cNvSpPr/>
+          <p:nvPr/>
+        </p:nvSpPr>
+        <p:spPr>
+          <a:xfrm>
+            <a:off x="6675120" y="22370400"/>
+            <a:ext cx="1709640" cy="1881720"/>
+          </a:xfrm>
+          <a:prstGeom prst="rect">
+            <a:avLst/>
+          </a:prstGeom>
+          <a:solidFill>
+            <a:srgbClr val="ffffff"/>
+          </a:solidFill>
+          <a:ln>
+            <a:noFill/>
+          </a:ln>
+        </p:spPr>
+        <p:style>
+          <a:lnRef idx="0"/>
+          <a:fillRef idx="0"/>
+          <a:effectRef idx="0"/>
+          <a:fontRef idx="minor"/>
+        </p:style>
+        <p:txBody>
+          <a:bodyPr lIns="90000" rIns="90000" tIns="45000" bIns="45000"/>
+          <a:p>
+            <a:pPr algn="ctr">
+              <a:lnSpc>
+                <a:spcPct val="100000"/>
+              </a:lnSpc>
+            </a:pPr>
+            <a:r>
+              <a:rPr b="0" lang="en-US" sz="1800" spc="-1" strike="noStrike">
+                <a:solidFill>
+                  <a:srgbClr val="000000"/>
+                </a:solidFill>
+                <a:uFill>
+                  <a:solidFill>
+                    <a:srgbClr val="ffffff"/>
+                  </a:solidFill>
+                </a:uFill>
+                <a:latin typeface="Arial"/>
+              </a:rPr>
+              <a:t>Atlas of 3  boys 7.77-year old with no compulsive desire for chocolate</a:t>
+            </a:r>
+            <a:endParaRPr b="0" lang="en-US" sz="1800" spc="-1" strike="noStrike">
+              <a:solidFill>
+                <a:srgbClr val="000000"/>
+              </a:solidFill>
+              <a:uFill>
+                <a:solidFill>
+                  <a:srgbClr val="ffffff"/>
+                </a:solidFill>
+              </a:uFill>
+              <a:latin typeface="Arial"/>
+            </a:endParaRPr>
+          </a:p>
+        </p:txBody>
+      </p:sp>
+      <p:sp>
+        <p:nvSpPr>
+          <p:cNvPr id="85" name="CustomShape 34"/>
+          <p:cNvSpPr/>
+          <p:nvPr/>
+        </p:nvSpPr>
+        <p:spPr>
+          <a:xfrm>
+            <a:off x="13239360" y="24325920"/>
+            <a:ext cx="1753560" cy="767160"/>
+          </a:xfrm>
+          <a:prstGeom prst="rect">
+            <a:avLst/>
+          </a:prstGeom>
+          <a:solidFill>
+            <a:srgbClr val="ffffff"/>
+          </a:solidFill>
+          <a:ln>
+            <a:noFill/>
+          </a:ln>
+        </p:spPr>
+        <p:style>
+          <a:lnRef idx="0"/>
+          <a:fillRef idx="0"/>
+          <a:effectRef idx="0"/>
+          <a:fontRef idx="minor"/>
+        </p:style>
+        <p:txBody>
+          <a:bodyPr lIns="90000" rIns="90000" tIns="45000" bIns="45000"/>
+          <a:p>
+            <a:pPr algn="ctr">
+              <a:lnSpc>
+                <a:spcPct val="100000"/>
+              </a:lnSpc>
+            </a:pPr>
+            <a:r>
+              <a:rPr b="0" lang="en-US" sz="1600" spc="-1" strike="noStrike">
+                <a:solidFill>
+                  <a:srgbClr val="000000"/>
+                </a:solidFill>
+                <a:uFill>
+                  <a:solidFill>
+                    <a:srgbClr val="ffffff"/>
+                  </a:solidFill>
+                </a:uFill>
+                <a:latin typeface="Arial"/>
+              </a:rPr>
+              <a:t>Big brain inflammable atlas</a:t>
+            </a:r>
+            <a:endParaRPr b="0" lang="en-US" sz="1800" spc="-1" strike="noStrike">
+              <a:solidFill>
+                <a:srgbClr val="000000"/>
+              </a:solidFill>
+              <a:uFill>
+                <a:solidFill>
+                  <a:srgbClr val="ffffff"/>
+                </a:solidFill>
+              </a:uFill>
+              <a:latin typeface="Arial"/>
+            </a:endParaRPr>
+          </a:p>
+        </p:txBody>
+      </p:sp>
+      <p:sp>
+        <p:nvSpPr>
+          <p:cNvPr id="86" name="CustomShape 35"/>
+          <p:cNvSpPr/>
+          <p:nvPr/>
+        </p:nvSpPr>
+        <p:spPr>
+          <a:xfrm>
+            <a:off x="13186800" y="20030400"/>
+            <a:ext cx="1641960" cy="3417480"/>
+          </a:xfrm>
+          <a:prstGeom prst="rect">
+            <a:avLst/>
+          </a:prstGeom>
+          <a:solidFill>
+            <a:srgbClr val="ffffff"/>
+          </a:solidFill>
+          <a:ln>
+            <a:noFill/>
+          </a:ln>
+        </p:spPr>
+        <p:style>
+          <a:lnRef idx="0"/>
+          <a:fillRef idx="0"/>
+          <a:effectRef idx="0"/>
+          <a:fontRef idx="minor"/>
+        </p:style>
+        <p:txBody>
+          <a:bodyPr lIns="90000" rIns="90000" tIns="45000" bIns="45000"/>
+          <a:p>
+            <a:pPr algn="ctr">
+              <a:lnSpc>
+                <a:spcPct val="100000"/>
+              </a:lnSpc>
+            </a:pPr>
+            <a:r>
+              <a:rPr b="0" lang="en-US" sz="1800" spc="-1" strike="noStrike">
+                <a:solidFill>
+                  <a:srgbClr val="000000"/>
+                </a:solidFill>
+                <a:uFill>
+                  <a:solidFill>
+                    <a:srgbClr val="ffffff"/>
+                  </a:solidFill>
+                </a:uFill>
+                <a:latin typeface="Arial"/>
+              </a:rPr>
+              <a:t>Connectivity atlases: As many as there are interpretations of the brain networks times the number of parcellations times the number of laboratories</a:t>
+            </a:r>
+            <a:endParaRPr b="0" lang="en-US" sz="1800" spc="-1" strike="noStrike">
+              <a:solidFill>
+                <a:srgbClr val="000000"/>
+              </a:solidFill>
+              <a:uFill>
+                <a:solidFill>
+                  <a:srgbClr val="ffffff"/>
+                </a:solidFill>
+              </a:uFill>
+              <a:latin typeface="Arial"/>
+            </a:endParaRPr>
+          </a:p>
+        </p:txBody>
+      </p:sp>
+      <p:sp>
+        <p:nvSpPr>
+          <p:cNvPr id="87" name="CustomShape 36"/>
+          <p:cNvSpPr/>
+          <p:nvPr/>
+        </p:nvSpPr>
+        <p:spPr>
+          <a:xfrm>
+            <a:off x="6611040" y="24048720"/>
+            <a:ext cx="2075400" cy="365400"/>
+          </a:xfrm>
+          <a:prstGeom prst="rect">
+            <a:avLst/>
+          </a:prstGeom>
+          <a:solidFill>
+            <a:srgbClr val="ffffff"/>
+          </a:solidFill>
+          <a:ln>
+            <a:noFill/>
+          </a:ln>
+        </p:spPr>
+        <p:style>
+          <a:lnRef idx="0"/>
+          <a:fillRef idx="0"/>
+          <a:effectRef idx="0"/>
+          <a:fontRef idx="minor"/>
+        </p:style>
+        <p:txBody>
+          <a:bodyPr lIns="90000" rIns="90000" tIns="45000" bIns="45000"/>
+          <a:p>
+            <a:pPr algn="ctr">
+              <a:lnSpc>
+                <a:spcPct val="100000"/>
+              </a:lnSpc>
+            </a:pPr>
+            <a:r>
+              <a:rPr b="0" lang="en-US" sz="1800" spc="-1" strike="noStrike">
+                <a:solidFill>
+                  <a:srgbClr val="000000"/>
+                </a:solidFill>
+                <a:uFill>
+                  <a:solidFill>
+                    <a:srgbClr val="ffffff"/>
+                  </a:solidFill>
+                </a:uFill>
+                <a:latin typeface="Arial"/>
+              </a:rPr>
+              <a:t>Atlas version exp.</a:t>
+            </a:r>
+            <a:endParaRPr b="0" lang="en-US" sz="1800" spc="-1" strike="noStrike">
+              <a:solidFill>
+                <a:srgbClr val="000000"/>
+              </a:solidFill>
+              <a:uFill>
+                <a:solidFill>
+                  <a:srgbClr val="ffffff"/>
+                </a:solidFill>
+              </a:uFill>
+              <a:latin typeface="Arial"/>
+            </a:endParaRPr>
+          </a:p>
+        </p:txBody>
+      </p:sp>
+      <p:sp>
+        <p:nvSpPr>
+          <p:cNvPr id="88" name="CustomShape 37"/>
+          <p:cNvSpPr/>
+          <p:nvPr/>
+        </p:nvSpPr>
+        <p:spPr>
+          <a:xfrm>
+            <a:off x="6583680" y="24414480"/>
+            <a:ext cx="2246760" cy="611640"/>
+          </a:xfrm>
+          <a:prstGeom prst="rect">
+            <a:avLst/>
+          </a:prstGeom>
+          <a:solidFill>
+            <a:srgbClr val="ffffff"/>
+          </a:solidFill>
+          <a:ln>
+            <a:noFill/>
+          </a:ln>
+        </p:spPr>
+        <p:style>
+          <a:lnRef idx="0"/>
+          <a:fillRef idx="0"/>
+          <a:effectRef idx="0"/>
+          <a:fontRef idx="minor"/>
+        </p:style>
+        <p:txBody>
+          <a:bodyPr lIns="90000" rIns="90000" tIns="45000" bIns="45000"/>
+          <a:p>
+            <a:pPr algn="ctr">
+              <a:lnSpc>
+                <a:spcPct val="100000"/>
+              </a:lnSpc>
+            </a:pPr>
+            <a:r>
+              <a:rPr b="0" lang="en-US" sz="1800" spc="-1" strike="noStrike">
+                <a:solidFill>
+                  <a:srgbClr val="000000"/>
+                </a:solidFill>
+                <a:uFill>
+                  <a:solidFill>
+                    <a:srgbClr val="ffffff"/>
+                  </a:solidFill>
+                </a:uFill>
+                <a:latin typeface="Arial"/>
+              </a:rPr>
+              <a:t>Who knows what this one is ?</a:t>
+            </a:r>
+            <a:endParaRPr b="0" lang="en-US" sz="1800" spc="-1" strike="noStrike">
+              <a:solidFill>
+                <a:srgbClr val="000000"/>
+              </a:solidFill>
+              <a:uFill>
+                <a:solidFill>
+                  <a:srgbClr val="ffffff"/>
+                </a:solidFill>
+              </a:uFill>
+              <a:latin typeface="Arial"/>
+            </a:endParaRPr>
+          </a:p>
+        </p:txBody>
+      </p:sp>
     </p:spTree>
   </p:cSld>
   <p:timing>

</xml_diff>